<commit_message>
Developer Guide: tweak undo/redo diagrams
Some diagrams in the the explanation of the undo/redo feature take more
space than they need. This is especially a problem because that segment
is included in the sample Project Portfolio Page which has a page limit.

Let's tweak the relevant diagrams to be more space efficient.
</commit_message>
<xml_diff>
--- a/docs/diagrams/UndoRedoActivityDiagram.pptx
+++ b/docs/diagrams/UndoRedoActivityDiagram.pptx
@@ -138,7 +138,7 @@
           <p:cNvPr id="2" name="Title 1">
             <a:extLst>
               <a:ext uri="{FF2B5EF4-FFF2-40B4-BE49-F238E27FC236}">
-                <a16:creationId xmlns:a16="http://schemas.microsoft.com/office/drawing/2014/main" id="{CE1B3102-23FE-4A07-92CF-8DB8025B5C54}"/>
+                <a16:creationId xmlns:a16="http://schemas.microsoft.com/office/drawing/2014/main" xmlns="" id="{CE1B3102-23FE-4A07-92CF-8DB8025B5C54}"/>
               </a:ext>
             </a:extLst>
           </p:cNvPr>
@@ -176,7 +176,7 @@
           <p:cNvPr id="3" name="Subtitle 2">
             <a:extLst>
               <a:ext uri="{FF2B5EF4-FFF2-40B4-BE49-F238E27FC236}">
-                <a16:creationId xmlns:a16="http://schemas.microsoft.com/office/drawing/2014/main" id="{09A64644-374F-4763-B477-E75EED09E18A}"/>
+                <a16:creationId xmlns:a16="http://schemas.microsoft.com/office/drawing/2014/main" xmlns="" id="{09A64644-374F-4763-B477-E75EED09E18A}"/>
               </a:ext>
             </a:extLst>
           </p:cNvPr>
@@ -247,7 +247,7 @@
           <p:cNvPr id="4" name="Date Placeholder 3">
             <a:extLst>
               <a:ext uri="{FF2B5EF4-FFF2-40B4-BE49-F238E27FC236}">
-                <a16:creationId xmlns:a16="http://schemas.microsoft.com/office/drawing/2014/main" id="{26CAD04B-553E-4EE0-8FEC-DA9E05F22F2C}"/>
+                <a16:creationId xmlns:a16="http://schemas.microsoft.com/office/drawing/2014/main" xmlns="" id="{26CAD04B-553E-4EE0-8FEC-DA9E05F22F2C}"/>
               </a:ext>
             </a:extLst>
           </p:cNvPr>
@@ -265,7 +265,7 @@
           <a:p>
             <a:fld id="{542F47FF-5056-41FF-A1F8-23A414798AA4}" type="datetimeFigureOut">
               <a:rPr lang="en-SG" smtClean="0"/>
-              <a:t>29/7/2017</a:t>
+              <a:t>30/12/2017</a:t>
             </a:fld>
             <a:endParaRPr lang="en-SG"/>
           </a:p>
@@ -276,7 +276,7 @@
           <p:cNvPr id="5" name="Footer Placeholder 4">
             <a:extLst>
               <a:ext uri="{FF2B5EF4-FFF2-40B4-BE49-F238E27FC236}">
-                <a16:creationId xmlns:a16="http://schemas.microsoft.com/office/drawing/2014/main" id="{E6F42670-2AD7-448C-BB6C-D759C9255DEB}"/>
+                <a16:creationId xmlns:a16="http://schemas.microsoft.com/office/drawing/2014/main" xmlns="" id="{E6F42670-2AD7-448C-BB6C-D759C9255DEB}"/>
               </a:ext>
             </a:extLst>
           </p:cNvPr>
@@ -301,7 +301,7 @@
           <p:cNvPr id="6" name="Slide Number Placeholder 5">
             <a:extLst>
               <a:ext uri="{FF2B5EF4-FFF2-40B4-BE49-F238E27FC236}">
-                <a16:creationId xmlns:a16="http://schemas.microsoft.com/office/drawing/2014/main" id="{8CFAA546-9089-42A6-8CCB-5E88855E6CB1}"/>
+                <a16:creationId xmlns:a16="http://schemas.microsoft.com/office/drawing/2014/main" xmlns="" id="{8CFAA546-9089-42A6-8CCB-5E88855E6CB1}"/>
               </a:ext>
             </a:extLst>
           </p:cNvPr>
@@ -360,7 +360,7 @@
           <p:cNvPr id="2" name="Title 1">
             <a:extLst>
               <a:ext uri="{FF2B5EF4-FFF2-40B4-BE49-F238E27FC236}">
-                <a16:creationId xmlns:a16="http://schemas.microsoft.com/office/drawing/2014/main" id="{C73C8897-08BA-4903-B8F2-48E6E6713059}"/>
+                <a16:creationId xmlns:a16="http://schemas.microsoft.com/office/drawing/2014/main" xmlns="" id="{C73C8897-08BA-4903-B8F2-48E6E6713059}"/>
               </a:ext>
             </a:extLst>
           </p:cNvPr>
@@ -389,7 +389,7 @@
           <p:cNvPr id="3" name="Vertical Text Placeholder 2">
             <a:extLst>
               <a:ext uri="{FF2B5EF4-FFF2-40B4-BE49-F238E27FC236}">
-                <a16:creationId xmlns:a16="http://schemas.microsoft.com/office/drawing/2014/main" id="{F4DB86F3-F3A8-4AC4-A2D0-18858F9E9EAF}"/>
+                <a16:creationId xmlns:a16="http://schemas.microsoft.com/office/drawing/2014/main" xmlns="" id="{F4DB86F3-F3A8-4AC4-A2D0-18858F9E9EAF}"/>
               </a:ext>
             </a:extLst>
           </p:cNvPr>
@@ -447,7 +447,7 @@
           <p:cNvPr id="4" name="Date Placeholder 3">
             <a:extLst>
               <a:ext uri="{FF2B5EF4-FFF2-40B4-BE49-F238E27FC236}">
-                <a16:creationId xmlns:a16="http://schemas.microsoft.com/office/drawing/2014/main" id="{22C4FC92-3E88-48DC-9327-19CD6A48E96D}"/>
+                <a16:creationId xmlns:a16="http://schemas.microsoft.com/office/drawing/2014/main" xmlns="" id="{22C4FC92-3E88-48DC-9327-19CD6A48E96D}"/>
               </a:ext>
             </a:extLst>
           </p:cNvPr>
@@ -465,7 +465,7 @@
           <a:p>
             <a:fld id="{542F47FF-5056-41FF-A1F8-23A414798AA4}" type="datetimeFigureOut">
               <a:rPr lang="en-SG" smtClean="0"/>
-              <a:t>29/7/2017</a:t>
+              <a:t>30/12/2017</a:t>
             </a:fld>
             <a:endParaRPr lang="en-SG"/>
           </a:p>
@@ -476,7 +476,7 @@
           <p:cNvPr id="5" name="Footer Placeholder 4">
             <a:extLst>
               <a:ext uri="{FF2B5EF4-FFF2-40B4-BE49-F238E27FC236}">
-                <a16:creationId xmlns:a16="http://schemas.microsoft.com/office/drawing/2014/main" id="{AA190F3C-D185-4E17-A1B5-D7F4DF331BE0}"/>
+                <a16:creationId xmlns:a16="http://schemas.microsoft.com/office/drawing/2014/main" xmlns="" id="{AA190F3C-D185-4E17-A1B5-D7F4DF331BE0}"/>
               </a:ext>
             </a:extLst>
           </p:cNvPr>
@@ -501,7 +501,7 @@
           <p:cNvPr id="6" name="Slide Number Placeholder 5">
             <a:extLst>
               <a:ext uri="{FF2B5EF4-FFF2-40B4-BE49-F238E27FC236}">
-                <a16:creationId xmlns:a16="http://schemas.microsoft.com/office/drawing/2014/main" id="{0F2506F5-483C-4F84-8363-1D309E459ADD}"/>
+                <a16:creationId xmlns:a16="http://schemas.microsoft.com/office/drawing/2014/main" xmlns="" id="{0F2506F5-483C-4F84-8363-1D309E459ADD}"/>
               </a:ext>
             </a:extLst>
           </p:cNvPr>
@@ -560,7 +560,7 @@
           <p:cNvPr id="2" name="Vertical Title 1">
             <a:extLst>
               <a:ext uri="{FF2B5EF4-FFF2-40B4-BE49-F238E27FC236}">
-                <a16:creationId xmlns:a16="http://schemas.microsoft.com/office/drawing/2014/main" id="{967C03EB-4647-4E98-B84F-7651E807A990}"/>
+                <a16:creationId xmlns:a16="http://schemas.microsoft.com/office/drawing/2014/main" xmlns="" id="{967C03EB-4647-4E98-B84F-7651E807A990}"/>
               </a:ext>
             </a:extLst>
           </p:cNvPr>
@@ -594,7 +594,7 @@
           <p:cNvPr id="3" name="Vertical Text Placeholder 2">
             <a:extLst>
               <a:ext uri="{FF2B5EF4-FFF2-40B4-BE49-F238E27FC236}">
-                <a16:creationId xmlns:a16="http://schemas.microsoft.com/office/drawing/2014/main" id="{22B1D2A8-918A-4854-959C-EDA5D46D2D74}"/>
+                <a16:creationId xmlns:a16="http://schemas.microsoft.com/office/drawing/2014/main" xmlns="" id="{22B1D2A8-918A-4854-959C-EDA5D46D2D74}"/>
               </a:ext>
             </a:extLst>
           </p:cNvPr>
@@ -657,7 +657,7 @@
           <p:cNvPr id="4" name="Date Placeholder 3">
             <a:extLst>
               <a:ext uri="{FF2B5EF4-FFF2-40B4-BE49-F238E27FC236}">
-                <a16:creationId xmlns:a16="http://schemas.microsoft.com/office/drawing/2014/main" id="{3F77D3B6-616A-4D06-980E-5A7866F9BB49}"/>
+                <a16:creationId xmlns:a16="http://schemas.microsoft.com/office/drawing/2014/main" xmlns="" id="{3F77D3B6-616A-4D06-980E-5A7866F9BB49}"/>
               </a:ext>
             </a:extLst>
           </p:cNvPr>
@@ -675,7 +675,7 @@
           <a:p>
             <a:fld id="{542F47FF-5056-41FF-A1F8-23A414798AA4}" type="datetimeFigureOut">
               <a:rPr lang="en-SG" smtClean="0"/>
-              <a:t>29/7/2017</a:t>
+              <a:t>30/12/2017</a:t>
             </a:fld>
             <a:endParaRPr lang="en-SG"/>
           </a:p>
@@ -686,7 +686,7 @@
           <p:cNvPr id="5" name="Footer Placeholder 4">
             <a:extLst>
               <a:ext uri="{FF2B5EF4-FFF2-40B4-BE49-F238E27FC236}">
-                <a16:creationId xmlns:a16="http://schemas.microsoft.com/office/drawing/2014/main" id="{20525AA2-4FD6-4C5E-B28C-2C71AF011737}"/>
+                <a16:creationId xmlns:a16="http://schemas.microsoft.com/office/drawing/2014/main" xmlns="" id="{20525AA2-4FD6-4C5E-B28C-2C71AF011737}"/>
               </a:ext>
             </a:extLst>
           </p:cNvPr>
@@ -711,7 +711,7 @@
           <p:cNvPr id="6" name="Slide Number Placeholder 5">
             <a:extLst>
               <a:ext uri="{FF2B5EF4-FFF2-40B4-BE49-F238E27FC236}">
-                <a16:creationId xmlns:a16="http://schemas.microsoft.com/office/drawing/2014/main" id="{4E040DF9-BA3F-440A-8819-8D374D74F15E}"/>
+                <a16:creationId xmlns:a16="http://schemas.microsoft.com/office/drawing/2014/main" xmlns="" id="{4E040DF9-BA3F-440A-8819-8D374D74F15E}"/>
               </a:ext>
             </a:extLst>
           </p:cNvPr>
@@ -770,7 +770,7 @@
           <p:cNvPr id="2" name="Title 1">
             <a:extLst>
               <a:ext uri="{FF2B5EF4-FFF2-40B4-BE49-F238E27FC236}">
-                <a16:creationId xmlns:a16="http://schemas.microsoft.com/office/drawing/2014/main" id="{75C804EA-614F-485C-A53F-C32B83B67A30}"/>
+                <a16:creationId xmlns:a16="http://schemas.microsoft.com/office/drawing/2014/main" xmlns="" id="{75C804EA-614F-485C-A53F-C32B83B67A30}"/>
               </a:ext>
             </a:extLst>
           </p:cNvPr>
@@ -799,7 +799,7 @@
           <p:cNvPr id="3" name="Content Placeholder 2">
             <a:extLst>
               <a:ext uri="{FF2B5EF4-FFF2-40B4-BE49-F238E27FC236}">
-                <a16:creationId xmlns:a16="http://schemas.microsoft.com/office/drawing/2014/main" id="{912A86A6-5554-4D2F-97BB-2D649E738506}"/>
+                <a16:creationId xmlns:a16="http://schemas.microsoft.com/office/drawing/2014/main" xmlns="" id="{912A86A6-5554-4D2F-97BB-2D649E738506}"/>
               </a:ext>
             </a:extLst>
           </p:cNvPr>
@@ -857,7 +857,7 @@
           <p:cNvPr id="4" name="Date Placeholder 3">
             <a:extLst>
               <a:ext uri="{FF2B5EF4-FFF2-40B4-BE49-F238E27FC236}">
-                <a16:creationId xmlns:a16="http://schemas.microsoft.com/office/drawing/2014/main" id="{69704FB4-4D28-4A39-B81F-407E0DDD475C}"/>
+                <a16:creationId xmlns:a16="http://schemas.microsoft.com/office/drawing/2014/main" xmlns="" id="{69704FB4-4D28-4A39-B81F-407E0DDD475C}"/>
               </a:ext>
             </a:extLst>
           </p:cNvPr>
@@ -875,7 +875,7 @@
           <a:p>
             <a:fld id="{542F47FF-5056-41FF-A1F8-23A414798AA4}" type="datetimeFigureOut">
               <a:rPr lang="en-SG" smtClean="0"/>
-              <a:t>29/7/2017</a:t>
+              <a:t>30/12/2017</a:t>
             </a:fld>
             <a:endParaRPr lang="en-SG"/>
           </a:p>
@@ -886,7 +886,7 @@
           <p:cNvPr id="5" name="Footer Placeholder 4">
             <a:extLst>
               <a:ext uri="{FF2B5EF4-FFF2-40B4-BE49-F238E27FC236}">
-                <a16:creationId xmlns:a16="http://schemas.microsoft.com/office/drawing/2014/main" id="{AFDB90F4-6173-409D-8731-A4C292C33336}"/>
+                <a16:creationId xmlns:a16="http://schemas.microsoft.com/office/drawing/2014/main" xmlns="" id="{AFDB90F4-6173-409D-8731-A4C292C33336}"/>
               </a:ext>
             </a:extLst>
           </p:cNvPr>
@@ -911,7 +911,7 @@
           <p:cNvPr id="6" name="Slide Number Placeholder 5">
             <a:extLst>
               <a:ext uri="{FF2B5EF4-FFF2-40B4-BE49-F238E27FC236}">
-                <a16:creationId xmlns:a16="http://schemas.microsoft.com/office/drawing/2014/main" id="{0C00E245-E701-4B2E-925D-4322EFA20D66}"/>
+                <a16:creationId xmlns:a16="http://schemas.microsoft.com/office/drawing/2014/main" xmlns="" id="{0C00E245-E701-4B2E-925D-4322EFA20D66}"/>
               </a:ext>
             </a:extLst>
           </p:cNvPr>
@@ -970,7 +970,7 @@
           <p:cNvPr id="2" name="Title 1">
             <a:extLst>
               <a:ext uri="{FF2B5EF4-FFF2-40B4-BE49-F238E27FC236}">
-                <a16:creationId xmlns:a16="http://schemas.microsoft.com/office/drawing/2014/main" id="{2237510E-B988-4DCB-9C02-932F190AC101}"/>
+                <a16:creationId xmlns:a16="http://schemas.microsoft.com/office/drawing/2014/main" xmlns="" id="{2237510E-B988-4DCB-9C02-932F190AC101}"/>
               </a:ext>
             </a:extLst>
           </p:cNvPr>
@@ -1008,7 +1008,7 @@
           <p:cNvPr id="3" name="Text Placeholder 2">
             <a:extLst>
               <a:ext uri="{FF2B5EF4-FFF2-40B4-BE49-F238E27FC236}">
-                <a16:creationId xmlns:a16="http://schemas.microsoft.com/office/drawing/2014/main" id="{784A23DD-6E19-4939-A085-751F973752F5}"/>
+                <a16:creationId xmlns:a16="http://schemas.microsoft.com/office/drawing/2014/main" xmlns="" id="{784A23DD-6E19-4939-A085-751F973752F5}"/>
               </a:ext>
             </a:extLst>
           </p:cNvPr>
@@ -1133,7 +1133,7 @@
           <p:cNvPr id="4" name="Date Placeholder 3">
             <a:extLst>
               <a:ext uri="{FF2B5EF4-FFF2-40B4-BE49-F238E27FC236}">
-                <a16:creationId xmlns:a16="http://schemas.microsoft.com/office/drawing/2014/main" id="{CD5B15F4-A7B8-4D17-8C46-94AC6465D19A}"/>
+                <a16:creationId xmlns:a16="http://schemas.microsoft.com/office/drawing/2014/main" xmlns="" id="{CD5B15F4-A7B8-4D17-8C46-94AC6465D19A}"/>
               </a:ext>
             </a:extLst>
           </p:cNvPr>
@@ -1151,7 +1151,7 @@
           <a:p>
             <a:fld id="{542F47FF-5056-41FF-A1F8-23A414798AA4}" type="datetimeFigureOut">
               <a:rPr lang="en-SG" smtClean="0"/>
-              <a:t>29/7/2017</a:t>
+              <a:t>30/12/2017</a:t>
             </a:fld>
             <a:endParaRPr lang="en-SG"/>
           </a:p>
@@ -1162,7 +1162,7 @@
           <p:cNvPr id="5" name="Footer Placeholder 4">
             <a:extLst>
               <a:ext uri="{FF2B5EF4-FFF2-40B4-BE49-F238E27FC236}">
-                <a16:creationId xmlns:a16="http://schemas.microsoft.com/office/drawing/2014/main" id="{0CC0B098-2820-40C0-8166-283BB17CD72D}"/>
+                <a16:creationId xmlns:a16="http://schemas.microsoft.com/office/drawing/2014/main" xmlns="" id="{0CC0B098-2820-40C0-8166-283BB17CD72D}"/>
               </a:ext>
             </a:extLst>
           </p:cNvPr>
@@ -1187,7 +1187,7 @@
           <p:cNvPr id="6" name="Slide Number Placeholder 5">
             <a:extLst>
               <a:ext uri="{FF2B5EF4-FFF2-40B4-BE49-F238E27FC236}">
-                <a16:creationId xmlns:a16="http://schemas.microsoft.com/office/drawing/2014/main" id="{CA1D6085-5297-4CE0-858B-F5A8477F21A1}"/>
+                <a16:creationId xmlns:a16="http://schemas.microsoft.com/office/drawing/2014/main" xmlns="" id="{CA1D6085-5297-4CE0-858B-F5A8477F21A1}"/>
               </a:ext>
             </a:extLst>
           </p:cNvPr>
@@ -1246,7 +1246,7 @@
           <p:cNvPr id="2" name="Title 1">
             <a:extLst>
               <a:ext uri="{FF2B5EF4-FFF2-40B4-BE49-F238E27FC236}">
-                <a16:creationId xmlns:a16="http://schemas.microsoft.com/office/drawing/2014/main" id="{C8312645-9305-4015-B5DF-8CD06CE54CD2}"/>
+                <a16:creationId xmlns:a16="http://schemas.microsoft.com/office/drawing/2014/main" xmlns="" id="{C8312645-9305-4015-B5DF-8CD06CE54CD2}"/>
               </a:ext>
             </a:extLst>
           </p:cNvPr>
@@ -1275,7 +1275,7 @@
           <p:cNvPr id="3" name="Content Placeholder 2">
             <a:extLst>
               <a:ext uri="{FF2B5EF4-FFF2-40B4-BE49-F238E27FC236}">
-                <a16:creationId xmlns:a16="http://schemas.microsoft.com/office/drawing/2014/main" id="{5F718F3D-23A6-4BAE-A195-9290BED99436}"/>
+                <a16:creationId xmlns:a16="http://schemas.microsoft.com/office/drawing/2014/main" xmlns="" id="{5F718F3D-23A6-4BAE-A195-9290BED99436}"/>
               </a:ext>
             </a:extLst>
           </p:cNvPr>
@@ -1338,7 +1338,7 @@
           <p:cNvPr id="4" name="Content Placeholder 3">
             <a:extLst>
               <a:ext uri="{FF2B5EF4-FFF2-40B4-BE49-F238E27FC236}">
-                <a16:creationId xmlns:a16="http://schemas.microsoft.com/office/drawing/2014/main" id="{987DE0C4-EF3A-42E6-9D3E-22C7A0BC9A37}"/>
+                <a16:creationId xmlns:a16="http://schemas.microsoft.com/office/drawing/2014/main" xmlns="" id="{987DE0C4-EF3A-42E6-9D3E-22C7A0BC9A37}"/>
               </a:ext>
             </a:extLst>
           </p:cNvPr>
@@ -1401,7 +1401,7 @@
           <p:cNvPr id="5" name="Date Placeholder 4">
             <a:extLst>
               <a:ext uri="{FF2B5EF4-FFF2-40B4-BE49-F238E27FC236}">
-                <a16:creationId xmlns:a16="http://schemas.microsoft.com/office/drawing/2014/main" id="{E4BFA167-4D74-44D4-AA06-F7DBEA7BB015}"/>
+                <a16:creationId xmlns:a16="http://schemas.microsoft.com/office/drawing/2014/main" xmlns="" id="{E4BFA167-4D74-44D4-AA06-F7DBEA7BB015}"/>
               </a:ext>
             </a:extLst>
           </p:cNvPr>
@@ -1419,7 +1419,7 @@
           <a:p>
             <a:fld id="{542F47FF-5056-41FF-A1F8-23A414798AA4}" type="datetimeFigureOut">
               <a:rPr lang="en-SG" smtClean="0"/>
-              <a:t>29/7/2017</a:t>
+              <a:t>30/12/2017</a:t>
             </a:fld>
             <a:endParaRPr lang="en-SG"/>
           </a:p>
@@ -1430,7 +1430,7 @@
           <p:cNvPr id="6" name="Footer Placeholder 5">
             <a:extLst>
               <a:ext uri="{FF2B5EF4-FFF2-40B4-BE49-F238E27FC236}">
-                <a16:creationId xmlns:a16="http://schemas.microsoft.com/office/drawing/2014/main" id="{000F966C-5803-470B-AFA7-C187FB7AE76F}"/>
+                <a16:creationId xmlns:a16="http://schemas.microsoft.com/office/drawing/2014/main" xmlns="" id="{000F966C-5803-470B-AFA7-C187FB7AE76F}"/>
               </a:ext>
             </a:extLst>
           </p:cNvPr>
@@ -1455,7 +1455,7 @@
           <p:cNvPr id="7" name="Slide Number Placeholder 6">
             <a:extLst>
               <a:ext uri="{FF2B5EF4-FFF2-40B4-BE49-F238E27FC236}">
-                <a16:creationId xmlns:a16="http://schemas.microsoft.com/office/drawing/2014/main" id="{C5072683-17F0-489D-BA30-0EAE1A9786AE}"/>
+                <a16:creationId xmlns:a16="http://schemas.microsoft.com/office/drawing/2014/main" xmlns="" id="{C5072683-17F0-489D-BA30-0EAE1A9786AE}"/>
               </a:ext>
             </a:extLst>
           </p:cNvPr>
@@ -1514,7 +1514,7 @@
           <p:cNvPr id="2" name="Title 1">
             <a:extLst>
               <a:ext uri="{FF2B5EF4-FFF2-40B4-BE49-F238E27FC236}">
-                <a16:creationId xmlns:a16="http://schemas.microsoft.com/office/drawing/2014/main" id="{CEC7B897-F9D1-4F32-BB47-48174A5ED64C}"/>
+                <a16:creationId xmlns:a16="http://schemas.microsoft.com/office/drawing/2014/main" xmlns="" id="{CEC7B897-F9D1-4F32-BB47-48174A5ED64C}"/>
               </a:ext>
             </a:extLst>
           </p:cNvPr>
@@ -1548,7 +1548,7 @@
           <p:cNvPr id="3" name="Text Placeholder 2">
             <a:extLst>
               <a:ext uri="{FF2B5EF4-FFF2-40B4-BE49-F238E27FC236}">
-                <a16:creationId xmlns:a16="http://schemas.microsoft.com/office/drawing/2014/main" id="{F641612B-9729-43C6-B566-AD5088E65020}"/>
+                <a16:creationId xmlns:a16="http://schemas.microsoft.com/office/drawing/2014/main" xmlns="" id="{F641612B-9729-43C6-B566-AD5088E65020}"/>
               </a:ext>
             </a:extLst>
           </p:cNvPr>
@@ -1619,7 +1619,7 @@
           <p:cNvPr id="4" name="Content Placeholder 3">
             <a:extLst>
               <a:ext uri="{FF2B5EF4-FFF2-40B4-BE49-F238E27FC236}">
-                <a16:creationId xmlns:a16="http://schemas.microsoft.com/office/drawing/2014/main" id="{C9E1DDFB-755B-486A-8E6E-CC7CFE66970C}"/>
+                <a16:creationId xmlns:a16="http://schemas.microsoft.com/office/drawing/2014/main" xmlns="" id="{C9E1DDFB-755B-486A-8E6E-CC7CFE66970C}"/>
               </a:ext>
             </a:extLst>
           </p:cNvPr>
@@ -1682,7 +1682,7 @@
           <p:cNvPr id="5" name="Text Placeholder 4">
             <a:extLst>
               <a:ext uri="{FF2B5EF4-FFF2-40B4-BE49-F238E27FC236}">
-                <a16:creationId xmlns:a16="http://schemas.microsoft.com/office/drawing/2014/main" id="{9C513BAE-7453-4E00-A4D1-7192F85ACD26}"/>
+                <a16:creationId xmlns:a16="http://schemas.microsoft.com/office/drawing/2014/main" xmlns="" id="{9C513BAE-7453-4E00-A4D1-7192F85ACD26}"/>
               </a:ext>
             </a:extLst>
           </p:cNvPr>
@@ -1753,7 +1753,7 @@
           <p:cNvPr id="6" name="Content Placeholder 5">
             <a:extLst>
               <a:ext uri="{FF2B5EF4-FFF2-40B4-BE49-F238E27FC236}">
-                <a16:creationId xmlns:a16="http://schemas.microsoft.com/office/drawing/2014/main" id="{CD44104D-C0AE-4458-869E-DFF710C415CC}"/>
+                <a16:creationId xmlns:a16="http://schemas.microsoft.com/office/drawing/2014/main" xmlns="" id="{CD44104D-C0AE-4458-869E-DFF710C415CC}"/>
               </a:ext>
             </a:extLst>
           </p:cNvPr>
@@ -1816,7 +1816,7 @@
           <p:cNvPr id="7" name="Date Placeholder 6">
             <a:extLst>
               <a:ext uri="{FF2B5EF4-FFF2-40B4-BE49-F238E27FC236}">
-                <a16:creationId xmlns:a16="http://schemas.microsoft.com/office/drawing/2014/main" id="{4CB7CAF3-D690-40A3-88F7-9D0D17864C18}"/>
+                <a16:creationId xmlns:a16="http://schemas.microsoft.com/office/drawing/2014/main" xmlns="" id="{4CB7CAF3-D690-40A3-88F7-9D0D17864C18}"/>
               </a:ext>
             </a:extLst>
           </p:cNvPr>
@@ -1834,7 +1834,7 @@
           <a:p>
             <a:fld id="{542F47FF-5056-41FF-A1F8-23A414798AA4}" type="datetimeFigureOut">
               <a:rPr lang="en-SG" smtClean="0"/>
-              <a:t>29/7/2017</a:t>
+              <a:t>30/12/2017</a:t>
             </a:fld>
             <a:endParaRPr lang="en-SG"/>
           </a:p>
@@ -1845,7 +1845,7 @@
           <p:cNvPr id="8" name="Footer Placeholder 7">
             <a:extLst>
               <a:ext uri="{FF2B5EF4-FFF2-40B4-BE49-F238E27FC236}">
-                <a16:creationId xmlns:a16="http://schemas.microsoft.com/office/drawing/2014/main" id="{E3FCCAB0-63DD-4704-AA42-E4F81E641DA3}"/>
+                <a16:creationId xmlns:a16="http://schemas.microsoft.com/office/drawing/2014/main" xmlns="" id="{E3FCCAB0-63DD-4704-AA42-E4F81E641DA3}"/>
               </a:ext>
             </a:extLst>
           </p:cNvPr>
@@ -1870,7 +1870,7 @@
           <p:cNvPr id="9" name="Slide Number Placeholder 8">
             <a:extLst>
               <a:ext uri="{FF2B5EF4-FFF2-40B4-BE49-F238E27FC236}">
-                <a16:creationId xmlns:a16="http://schemas.microsoft.com/office/drawing/2014/main" id="{604EFCC3-8687-4BC3-9C9E-60FD561B237F}"/>
+                <a16:creationId xmlns:a16="http://schemas.microsoft.com/office/drawing/2014/main" xmlns="" id="{604EFCC3-8687-4BC3-9C9E-60FD561B237F}"/>
               </a:ext>
             </a:extLst>
           </p:cNvPr>
@@ -1929,7 +1929,7 @@
           <p:cNvPr id="2" name="Title 1">
             <a:extLst>
               <a:ext uri="{FF2B5EF4-FFF2-40B4-BE49-F238E27FC236}">
-                <a16:creationId xmlns:a16="http://schemas.microsoft.com/office/drawing/2014/main" id="{D324AE97-E2C9-4642-887A-4474C5566AA6}"/>
+                <a16:creationId xmlns:a16="http://schemas.microsoft.com/office/drawing/2014/main" xmlns="" id="{D324AE97-E2C9-4642-887A-4474C5566AA6}"/>
               </a:ext>
             </a:extLst>
           </p:cNvPr>
@@ -1958,7 +1958,7 @@
           <p:cNvPr id="3" name="Date Placeholder 2">
             <a:extLst>
               <a:ext uri="{FF2B5EF4-FFF2-40B4-BE49-F238E27FC236}">
-                <a16:creationId xmlns:a16="http://schemas.microsoft.com/office/drawing/2014/main" id="{919EDCEA-D8A9-431E-AF93-4824C03FD0F2}"/>
+                <a16:creationId xmlns:a16="http://schemas.microsoft.com/office/drawing/2014/main" xmlns="" id="{919EDCEA-D8A9-431E-AF93-4824C03FD0F2}"/>
               </a:ext>
             </a:extLst>
           </p:cNvPr>
@@ -1976,7 +1976,7 @@
           <a:p>
             <a:fld id="{542F47FF-5056-41FF-A1F8-23A414798AA4}" type="datetimeFigureOut">
               <a:rPr lang="en-SG" smtClean="0"/>
-              <a:t>29/7/2017</a:t>
+              <a:t>30/12/2017</a:t>
             </a:fld>
             <a:endParaRPr lang="en-SG"/>
           </a:p>
@@ -1987,7 +1987,7 @@
           <p:cNvPr id="4" name="Footer Placeholder 3">
             <a:extLst>
               <a:ext uri="{FF2B5EF4-FFF2-40B4-BE49-F238E27FC236}">
-                <a16:creationId xmlns:a16="http://schemas.microsoft.com/office/drawing/2014/main" id="{1F13DD51-16D3-435A-A475-0C2A7255A05E}"/>
+                <a16:creationId xmlns:a16="http://schemas.microsoft.com/office/drawing/2014/main" xmlns="" id="{1F13DD51-16D3-435A-A475-0C2A7255A05E}"/>
               </a:ext>
             </a:extLst>
           </p:cNvPr>
@@ -2012,7 +2012,7 @@
           <p:cNvPr id="5" name="Slide Number Placeholder 4">
             <a:extLst>
               <a:ext uri="{FF2B5EF4-FFF2-40B4-BE49-F238E27FC236}">
-                <a16:creationId xmlns:a16="http://schemas.microsoft.com/office/drawing/2014/main" id="{3D7AC15F-BADE-4466-835A-57B1A9E5162B}"/>
+                <a16:creationId xmlns:a16="http://schemas.microsoft.com/office/drawing/2014/main" xmlns="" id="{3D7AC15F-BADE-4466-835A-57B1A9E5162B}"/>
               </a:ext>
             </a:extLst>
           </p:cNvPr>
@@ -2071,7 +2071,7 @@
           <p:cNvPr id="2" name="Date Placeholder 1">
             <a:extLst>
               <a:ext uri="{FF2B5EF4-FFF2-40B4-BE49-F238E27FC236}">
-                <a16:creationId xmlns:a16="http://schemas.microsoft.com/office/drawing/2014/main" id="{48F01CC8-EEC4-4B3C-8C73-3EBB7DCEBE67}"/>
+                <a16:creationId xmlns:a16="http://schemas.microsoft.com/office/drawing/2014/main" xmlns="" id="{48F01CC8-EEC4-4B3C-8C73-3EBB7DCEBE67}"/>
               </a:ext>
             </a:extLst>
           </p:cNvPr>
@@ -2089,7 +2089,7 @@
           <a:p>
             <a:fld id="{542F47FF-5056-41FF-A1F8-23A414798AA4}" type="datetimeFigureOut">
               <a:rPr lang="en-SG" smtClean="0"/>
-              <a:t>29/7/2017</a:t>
+              <a:t>30/12/2017</a:t>
             </a:fld>
             <a:endParaRPr lang="en-SG"/>
           </a:p>
@@ -2100,7 +2100,7 @@
           <p:cNvPr id="3" name="Footer Placeholder 2">
             <a:extLst>
               <a:ext uri="{FF2B5EF4-FFF2-40B4-BE49-F238E27FC236}">
-                <a16:creationId xmlns:a16="http://schemas.microsoft.com/office/drawing/2014/main" id="{4D820BAF-6E28-43DA-9E9B-8C229AB2A964}"/>
+                <a16:creationId xmlns:a16="http://schemas.microsoft.com/office/drawing/2014/main" xmlns="" id="{4D820BAF-6E28-43DA-9E9B-8C229AB2A964}"/>
               </a:ext>
             </a:extLst>
           </p:cNvPr>
@@ -2125,7 +2125,7 @@
           <p:cNvPr id="4" name="Slide Number Placeholder 3">
             <a:extLst>
               <a:ext uri="{FF2B5EF4-FFF2-40B4-BE49-F238E27FC236}">
-                <a16:creationId xmlns:a16="http://schemas.microsoft.com/office/drawing/2014/main" id="{49BFE3EF-B472-4F66-80D5-1B722E8086E6}"/>
+                <a16:creationId xmlns:a16="http://schemas.microsoft.com/office/drawing/2014/main" xmlns="" id="{49BFE3EF-B472-4F66-80D5-1B722E8086E6}"/>
               </a:ext>
             </a:extLst>
           </p:cNvPr>
@@ -2184,7 +2184,7 @@
           <p:cNvPr id="2" name="Title 1">
             <a:extLst>
               <a:ext uri="{FF2B5EF4-FFF2-40B4-BE49-F238E27FC236}">
-                <a16:creationId xmlns:a16="http://schemas.microsoft.com/office/drawing/2014/main" id="{E1ABDE73-0F58-47D3-8C8B-C147DE1C0B22}"/>
+                <a16:creationId xmlns:a16="http://schemas.microsoft.com/office/drawing/2014/main" xmlns="" id="{E1ABDE73-0F58-47D3-8C8B-C147DE1C0B22}"/>
               </a:ext>
             </a:extLst>
           </p:cNvPr>
@@ -2222,7 +2222,7 @@
           <p:cNvPr id="3" name="Content Placeholder 2">
             <a:extLst>
               <a:ext uri="{FF2B5EF4-FFF2-40B4-BE49-F238E27FC236}">
-                <a16:creationId xmlns:a16="http://schemas.microsoft.com/office/drawing/2014/main" id="{0167F6A8-B979-42A6-B421-40577DD5582F}"/>
+                <a16:creationId xmlns:a16="http://schemas.microsoft.com/office/drawing/2014/main" xmlns="" id="{0167F6A8-B979-42A6-B421-40577DD5582F}"/>
               </a:ext>
             </a:extLst>
           </p:cNvPr>
@@ -2313,7 +2313,7 @@
           <p:cNvPr id="4" name="Text Placeholder 3">
             <a:extLst>
               <a:ext uri="{FF2B5EF4-FFF2-40B4-BE49-F238E27FC236}">
-                <a16:creationId xmlns:a16="http://schemas.microsoft.com/office/drawing/2014/main" id="{6887A488-06FE-46E9-8AC5-DF38A61CCF05}"/>
+                <a16:creationId xmlns:a16="http://schemas.microsoft.com/office/drawing/2014/main" xmlns="" id="{6887A488-06FE-46E9-8AC5-DF38A61CCF05}"/>
               </a:ext>
             </a:extLst>
           </p:cNvPr>
@@ -2384,7 +2384,7 @@
           <p:cNvPr id="5" name="Date Placeholder 4">
             <a:extLst>
               <a:ext uri="{FF2B5EF4-FFF2-40B4-BE49-F238E27FC236}">
-                <a16:creationId xmlns:a16="http://schemas.microsoft.com/office/drawing/2014/main" id="{1225C56B-78B2-45C0-A8A9-C9D435A286D0}"/>
+                <a16:creationId xmlns:a16="http://schemas.microsoft.com/office/drawing/2014/main" xmlns="" id="{1225C56B-78B2-45C0-A8A9-C9D435A286D0}"/>
               </a:ext>
             </a:extLst>
           </p:cNvPr>
@@ -2402,7 +2402,7 @@
           <a:p>
             <a:fld id="{542F47FF-5056-41FF-A1F8-23A414798AA4}" type="datetimeFigureOut">
               <a:rPr lang="en-SG" smtClean="0"/>
-              <a:t>29/7/2017</a:t>
+              <a:t>30/12/2017</a:t>
             </a:fld>
             <a:endParaRPr lang="en-SG"/>
           </a:p>
@@ -2413,7 +2413,7 @@
           <p:cNvPr id="6" name="Footer Placeholder 5">
             <a:extLst>
               <a:ext uri="{FF2B5EF4-FFF2-40B4-BE49-F238E27FC236}">
-                <a16:creationId xmlns:a16="http://schemas.microsoft.com/office/drawing/2014/main" id="{3F9E1B9E-B673-4E26-9323-D731DC395F9C}"/>
+                <a16:creationId xmlns:a16="http://schemas.microsoft.com/office/drawing/2014/main" xmlns="" id="{3F9E1B9E-B673-4E26-9323-D731DC395F9C}"/>
               </a:ext>
             </a:extLst>
           </p:cNvPr>
@@ -2438,7 +2438,7 @@
           <p:cNvPr id="7" name="Slide Number Placeholder 6">
             <a:extLst>
               <a:ext uri="{FF2B5EF4-FFF2-40B4-BE49-F238E27FC236}">
-                <a16:creationId xmlns:a16="http://schemas.microsoft.com/office/drawing/2014/main" id="{6633AB4A-8EB3-4154-869B-5580DEDF4F79}"/>
+                <a16:creationId xmlns:a16="http://schemas.microsoft.com/office/drawing/2014/main" xmlns="" id="{6633AB4A-8EB3-4154-869B-5580DEDF4F79}"/>
               </a:ext>
             </a:extLst>
           </p:cNvPr>
@@ -2497,7 +2497,7 @@
           <p:cNvPr id="2" name="Title 1">
             <a:extLst>
               <a:ext uri="{FF2B5EF4-FFF2-40B4-BE49-F238E27FC236}">
-                <a16:creationId xmlns:a16="http://schemas.microsoft.com/office/drawing/2014/main" id="{61D5430E-44A7-4B67-9F34-F532D5533356}"/>
+                <a16:creationId xmlns:a16="http://schemas.microsoft.com/office/drawing/2014/main" xmlns="" id="{61D5430E-44A7-4B67-9F34-F532D5533356}"/>
               </a:ext>
             </a:extLst>
           </p:cNvPr>
@@ -2535,7 +2535,7 @@
           <p:cNvPr id="3" name="Picture Placeholder 2">
             <a:extLst>
               <a:ext uri="{FF2B5EF4-FFF2-40B4-BE49-F238E27FC236}">
-                <a16:creationId xmlns:a16="http://schemas.microsoft.com/office/drawing/2014/main" id="{94374BCC-AC4A-4ED0-A7BD-6B2491EAED7E}"/>
+                <a16:creationId xmlns:a16="http://schemas.microsoft.com/office/drawing/2014/main" xmlns="" id="{94374BCC-AC4A-4ED0-A7BD-6B2491EAED7E}"/>
               </a:ext>
             </a:extLst>
           </p:cNvPr>
@@ -2602,7 +2602,7 @@
           <p:cNvPr id="4" name="Text Placeholder 3">
             <a:extLst>
               <a:ext uri="{FF2B5EF4-FFF2-40B4-BE49-F238E27FC236}">
-                <a16:creationId xmlns:a16="http://schemas.microsoft.com/office/drawing/2014/main" id="{5AD4568E-164B-462E-9285-49B735DD9DE7}"/>
+                <a16:creationId xmlns:a16="http://schemas.microsoft.com/office/drawing/2014/main" xmlns="" id="{5AD4568E-164B-462E-9285-49B735DD9DE7}"/>
               </a:ext>
             </a:extLst>
           </p:cNvPr>
@@ -2673,7 +2673,7 @@
           <p:cNvPr id="5" name="Date Placeholder 4">
             <a:extLst>
               <a:ext uri="{FF2B5EF4-FFF2-40B4-BE49-F238E27FC236}">
-                <a16:creationId xmlns:a16="http://schemas.microsoft.com/office/drawing/2014/main" id="{ABD88AB5-C9D0-4013-85B4-2228545F24AD}"/>
+                <a16:creationId xmlns:a16="http://schemas.microsoft.com/office/drawing/2014/main" xmlns="" id="{ABD88AB5-C9D0-4013-85B4-2228545F24AD}"/>
               </a:ext>
             </a:extLst>
           </p:cNvPr>
@@ -2691,7 +2691,7 @@
           <a:p>
             <a:fld id="{542F47FF-5056-41FF-A1F8-23A414798AA4}" type="datetimeFigureOut">
               <a:rPr lang="en-SG" smtClean="0"/>
-              <a:t>29/7/2017</a:t>
+              <a:t>30/12/2017</a:t>
             </a:fld>
             <a:endParaRPr lang="en-SG"/>
           </a:p>
@@ -2702,7 +2702,7 @@
           <p:cNvPr id="6" name="Footer Placeholder 5">
             <a:extLst>
               <a:ext uri="{FF2B5EF4-FFF2-40B4-BE49-F238E27FC236}">
-                <a16:creationId xmlns:a16="http://schemas.microsoft.com/office/drawing/2014/main" id="{6378A798-E2A6-4417-A003-DE553E8EC325}"/>
+                <a16:creationId xmlns:a16="http://schemas.microsoft.com/office/drawing/2014/main" xmlns="" id="{6378A798-E2A6-4417-A003-DE553E8EC325}"/>
               </a:ext>
             </a:extLst>
           </p:cNvPr>
@@ -2727,7 +2727,7 @@
           <p:cNvPr id="7" name="Slide Number Placeholder 6">
             <a:extLst>
               <a:ext uri="{FF2B5EF4-FFF2-40B4-BE49-F238E27FC236}">
-                <a16:creationId xmlns:a16="http://schemas.microsoft.com/office/drawing/2014/main" id="{7BC6852D-C345-455C-9499-B57AE4D2D943}"/>
+                <a16:creationId xmlns:a16="http://schemas.microsoft.com/office/drawing/2014/main" xmlns="" id="{7BC6852D-C345-455C-9499-B57AE4D2D943}"/>
               </a:ext>
             </a:extLst>
           </p:cNvPr>
@@ -2791,7 +2791,7 @@
           <p:cNvPr id="2" name="Title Placeholder 1">
             <a:extLst>
               <a:ext uri="{FF2B5EF4-FFF2-40B4-BE49-F238E27FC236}">
-                <a16:creationId xmlns:a16="http://schemas.microsoft.com/office/drawing/2014/main" id="{CF097353-E272-4974-B34C-369C28928CA1}"/>
+                <a16:creationId xmlns:a16="http://schemas.microsoft.com/office/drawing/2014/main" xmlns="" id="{CF097353-E272-4974-B34C-369C28928CA1}"/>
               </a:ext>
             </a:extLst>
           </p:cNvPr>
@@ -2830,7 +2830,7 @@
           <p:cNvPr id="3" name="Text Placeholder 2">
             <a:extLst>
               <a:ext uri="{FF2B5EF4-FFF2-40B4-BE49-F238E27FC236}">
-                <a16:creationId xmlns:a16="http://schemas.microsoft.com/office/drawing/2014/main" id="{BB1BE290-84C1-4415-A557-1ACC36D1226C}"/>
+                <a16:creationId xmlns:a16="http://schemas.microsoft.com/office/drawing/2014/main" xmlns="" id="{BB1BE290-84C1-4415-A557-1ACC36D1226C}"/>
               </a:ext>
             </a:extLst>
           </p:cNvPr>
@@ -2898,7 +2898,7 @@
           <p:cNvPr id="4" name="Date Placeholder 3">
             <a:extLst>
               <a:ext uri="{FF2B5EF4-FFF2-40B4-BE49-F238E27FC236}">
-                <a16:creationId xmlns:a16="http://schemas.microsoft.com/office/drawing/2014/main" id="{F7EAAB47-96EA-44D5-8293-0D696F52A395}"/>
+                <a16:creationId xmlns:a16="http://schemas.microsoft.com/office/drawing/2014/main" xmlns="" id="{F7EAAB47-96EA-44D5-8293-0D696F52A395}"/>
               </a:ext>
             </a:extLst>
           </p:cNvPr>
@@ -2934,7 +2934,7 @@
           <a:p>
             <a:fld id="{542F47FF-5056-41FF-A1F8-23A414798AA4}" type="datetimeFigureOut">
               <a:rPr lang="en-SG" smtClean="0"/>
-              <a:t>29/7/2017</a:t>
+              <a:t>30/12/2017</a:t>
             </a:fld>
             <a:endParaRPr lang="en-SG"/>
           </a:p>
@@ -2945,7 +2945,7 @@
           <p:cNvPr id="5" name="Footer Placeholder 4">
             <a:extLst>
               <a:ext uri="{FF2B5EF4-FFF2-40B4-BE49-F238E27FC236}">
-                <a16:creationId xmlns:a16="http://schemas.microsoft.com/office/drawing/2014/main" id="{F21C6E84-C98D-4391-98A0-E77A4221131C}"/>
+                <a16:creationId xmlns:a16="http://schemas.microsoft.com/office/drawing/2014/main" xmlns="" id="{F21C6E84-C98D-4391-98A0-E77A4221131C}"/>
               </a:ext>
             </a:extLst>
           </p:cNvPr>
@@ -2988,7 +2988,7 @@
           <p:cNvPr id="6" name="Slide Number Placeholder 5">
             <a:extLst>
               <a:ext uri="{FF2B5EF4-FFF2-40B4-BE49-F238E27FC236}">
-                <a16:creationId xmlns:a16="http://schemas.microsoft.com/office/drawing/2014/main" id="{FB352E9C-7394-48E0-A08D-56390F6520E1}"/>
+                <a16:creationId xmlns:a16="http://schemas.microsoft.com/office/drawing/2014/main" xmlns="" id="{FB352E9C-7394-48E0-A08D-56390F6520E1}"/>
               </a:ext>
             </a:extLst>
           </p:cNvPr>
@@ -3356,7 +3356,7 @@
           <p:cNvPr id="4" name="Oval 3">
             <a:extLst>
               <a:ext uri="{FF2B5EF4-FFF2-40B4-BE49-F238E27FC236}">
-                <a16:creationId xmlns:a16="http://schemas.microsoft.com/office/drawing/2014/main" id="{D45F487B-A914-4C8E-B564-00C9D621567D}"/>
+                <a16:creationId xmlns:a16="http://schemas.microsoft.com/office/drawing/2014/main" xmlns="" id="{D45F487B-A914-4C8E-B564-00C9D621567D}"/>
               </a:ext>
             </a:extLst>
           </p:cNvPr>
@@ -3365,7 +3365,7 @@
         </p:nvSpPr>
         <p:spPr>
           <a:xfrm>
-            <a:off x="3809163" y="-790611"/>
+            <a:off x="1120632" y="3200056"/>
             <a:ext cx="235669" cy="235669"/>
           </a:xfrm>
           <a:prstGeom prst="ellipse">
@@ -3405,20 +3405,21 @@
           <p:cNvPr id="6" name="Straight Arrow Connector 5">
             <a:extLst>
               <a:ext uri="{FF2B5EF4-FFF2-40B4-BE49-F238E27FC236}">
-                <a16:creationId xmlns:a16="http://schemas.microsoft.com/office/drawing/2014/main" id="{73D6638D-34B0-4D9A-B7DC-62ABF1C7D407}"/>
+                <a16:creationId xmlns:a16="http://schemas.microsoft.com/office/drawing/2014/main" xmlns="" id="{73D6638D-34B0-4D9A-B7DC-62ABF1C7D407}"/>
               </a:ext>
             </a:extLst>
           </p:cNvPr>
           <p:cNvCxnSpPr>
             <a:cxnSpLocks/>
             <a:stCxn id="4" idx="6"/>
+            <a:endCxn id="8" idx="1"/>
           </p:cNvCxnSpPr>
           <p:nvPr/>
         </p:nvCxnSpPr>
         <p:spPr>
           <a:xfrm>
-            <a:off x="4044835" y="-672776"/>
-            <a:ext cx="933253" cy="0"/>
+            <a:off x="1356301" y="3317891"/>
+            <a:ext cx="227605" cy="839"/>
           </a:xfrm>
           <a:prstGeom prst="straightConnector1">
             <a:avLst/>
@@ -3447,7 +3448,7 @@
           <p:cNvPr id="8" name="Rectangle: Rounded Corners 7">
             <a:extLst>
               <a:ext uri="{FF2B5EF4-FFF2-40B4-BE49-F238E27FC236}">
-                <a16:creationId xmlns:a16="http://schemas.microsoft.com/office/drawing/2014/main" id="{C13E6F3C-30CD-49FB-94D8-AF011F54E935}"/>
+                <a16:creationId xmlns:a16="http://schemas.microsoft.com/office/drawing/2014/main" xmlns="" id="{C13E6F3C-30CD-49FB-94D8-AF011F54E935}"/>
               </a:ext>
             </a:extLst>
           </p:cNvPr>
@@ -3456,8 +3457,8 @@
         </p:nvSpPr>
         <p:spPr>
           <a:xfrm>
-            <a:off x="4978087" y="-1030995"/>
-            <a:ext cx="2187019" cy="716437"/>
+            <a:off x="1583906" y="2960511"/>
+            <a:ext cx="1570355" cy="716437"/>
           </a:xfrm>
           <a:prstGeom prst="roundRect">
             <a:avLst/>
@@ -3499,20 +3500,20 @@
           <p:cNvPr id="9" name="Straight Arrow Connector 8">
             <a:extLst>
               <a:ext uri="{FF2B5EF4-FFF2-40B4-BE49-F238E27FC236}">
-                <a16:creationId xmlns:a16="http://schemas.microsoft.com/office/drawing/2014/main" id="{6A0B3198-7B18-417D-A041-B13DF5BAE7A6}"/>
+                <a16:creationId xmlns:a16="http://schemas.microsoft.com/office/drawing/2014/main" xmlns="" id="{6A0B3198-7B18-417D-A041-B13DF5BAE7A6}"/>
               </a:ext>
             </a:extLst>
           </p:cNvPr>
           <p:cNvCxnSpPr>
             <a:cxnSpLocks/>
-            <a:stCxn id="8" idx="2"/>
+            <a:stCxn id="8" idx="3"/>
           </p:cNvCxnSpPr>
           <p:nvPr/>
         </p:nvCxnSpPr>
         <p:spPr>
-          <a:xfrm flipH="1">
-            <a:off x="6071597" y="-314557"/>
-            <a:ext cx="2" cy="617456"/>
+          <a:xfrm flipV="1">
+            <a:off x="3154261" y="3317892"/>
+            <a:ext cx="389055" cy="838"/>
           </a:xfrm>
           <a:prstGeom prst="straightConnector1">
             <a:avLst/>
@@ -3541,7 +3542,7 @@
           <p:cNvPr id="12" name="Diamond 11">
             <a:extLst>
               <a:ext uri="{FF2B5EF4-FFF2-40B4-BE49-F238E27FC236}">
-                <a16:creationId xmlns:a16="http://schemas.microsoft.com/office/drawing/2014/main" id="{8E8723C3-03E7-46BE-8211-AAF9ADC7B033}"/>
+                <a16:creationId xmlns:a16="http://schemas.microsoft.com/office/drawing/2014/main" xmlns="" id="{8E8723C3-03E7-46BE-8211-AAF9ADC7B033}"/>
               </a:ext>
             </a:extLst>
           </p:cNvPr>
@@ -3550,7 +3551,7 @@
         </p:nvSpPr>
         <p:spPr>
           <a:xfrm>
-            <a:off x="5831214" y="302899"/>
+            <a:off x="3543314" y="3077508"/>
             <a:ext cx="480766" cy="480766"/>
           </a:xfrm>
           <a:prstGeom prst="diamond">
@@ -3585,101 +3586,22 @@
           </a:p>
         </p:txBody>
       </p:sp>
-      <p:cxnSp>
-        <p:nvCxnSpPr>
-          <p:cNvPr id="15" name="Straight Arrow Connector 14">
-            <a:extLst>
-              <a:ext uri="{FF2B5EF4-FFF2-40B4-BE49-F238E27FC236}">
-                <a16:creationId xmlns:a16="http://schemas.microsoft.com/office/drawing/2014/main" id="{46F847A3-19CB-4D8A-BF61-CBF1573B6170}"/>
-              </a:ext>
-            </a:extLst>
-          </p:cNvPr>
-          <p:cNvCxnSpPr>
-            <a:cxnSpLocks/>
-          </p:cNvCxnSpPr>
+      <p:sp>
+        <p:nvSpPr>
+          <p:cNvPr id="19" name="TextBox 18">
+            <a:extLst>
+              <a:ext uri="{FF2B5EF4-FFF2-40B4-BE49-F238E27FC236}">
+                <a16:creationId xmlns:a16="http://schemas.microsoft.com/office/drawing/2014/main" xmlns="" id="{3ABD3846-DF71-49C4-AE22-6CE1C8B39149}"/>
+              </a:ext>
+            </a:extLst>
+          </p:cNvPr>
+          <p:cNvSpPr txBox="1"/>
           <p:nvPr/>
-        </p:nvCxnSpPr>
-        <p:spPr>
-          <a:xfrm flipH="1">
-            <a:off x="5158771" y="543281"/>
-            <a:ext cx="2" cy="1003956"/>
-          </a:xfrm>
-          <a:prstGeom prst="straightConnector1">
-            <a:avLst/>
-          </a:prstGeom>
-          <a:ln>
-            <a:tailEnd type="triangle"/>
-          </a:ln>
-        </p:spPr>
-        <p:style>
-          <a:lnRef idx="1">
-            <a:schemeClr val="dk1"/>
-          </a:lnRef>
-          <a:fillRef idx="0">
-            <a:schemeClr val="dk1"/>
-          </a:fillRef>
-          <a:effectRef idx="0">
-            <a:schemeClr val="dk1"/>
-          </a:effectRef>
-          <a:fontRef idx="minor">
-            <a:schemeClr val="tx1"/>
-          </a:fontRef>
-        </p:style>
-      </p:cxnSp>
-      <p:cxnSp>
-        <p:nvCxnSpPr>
-          <p:cNvPr id="18" name="Straight Connector 17">
-            <a:extLst>
-              <a:ext uri="{FF2B5EF4-FFF2-40B4-BE49-F238E27FC236}">
-                <a16:creationId xmlns:a16="http://schemas.microsoft.com/office/drawing/2014/main" id="{E9F9F46E-F315-4E20-BA19-DC5A481900A9}"/>
-              </a:ext>
-            </a:extLst>
-          </p:cNvPr>
-          <p:cNvCxnSpPr>
-            <a:endCxn id="12" idx="1"/>
-          </p:cNvCxnSpPr>
-          <p:nvPr/>
-        </p:nvCxnSpPr>
+        </p:nvSpPr>
         <p:spPr>
           <a:xfrm>
-            <a:off x="5158768" y="543281"/>
-            <a:ext cx="672444" cy="2"/>
-          </a:xfrm>
-          <a:prstGeom prst="line">
-            <a:avLst/>
-          </a:prstGeom>
-        </p:spPr>
-        <p:style>
-          <a:lnRef idx="1">
-            <a:schemeClr val="dk1"/>
-          </a:lnRef>
-          <a:fillRef idx="0">
-            <a:schemeClr val="dk1"/>
-          </a:fillRef>
-          <a:effectRef idx="0">
-            <a:schemeClr val="dk1"/>
-          </a:effectRef>
-          <a:fontRef idx="minor">
-            <a:schemeClr val="tx1"/>
-          </a:fontRef>
-        </p:style>
-      </p:cxnSp>
-      <p:sp>
-        <p:nvSpPr>
-          <p:cNvPr id="19" name="TextBox 18">
-            <a:extLst>
-              <a:ext uri="{FF2B5EF4-FFF2-40B4-BE49-F238E27FC236}">
-                <a16:creationId xmlns:a16="http://schemas.microsoft.com/office/drawing/2014/main" id="{3ABD3846-DF71-49C4-AE22-6CE1C8B39149}"/>
-              </a:ext>
-            </a:extLst>
-          </p:cNvPr>
-          <p:cNvSpPr txBox="1"/>
-          <p:nvPr/>
-        </p:nvSpPr>
-        <p:spPr>
-          <a:xfrm>
-            <a:off x="4051905" y="118232"/>
-            <a:ext cx="1899500" cy="369460"/>
+            <a:off x="3721078" y="2483753"/>
+            <a:ext cx="1602669" cy="369460"/>
           </a:xfrm>
           <a:prstGeom prst="rect">
             <a:avLst/>
@@ -3693,18 +3615,18 @@
           <a:lstStyle/>
           <a:p>
             <a:r>
-              <a:rPr lang="en-SG" sz="1801" dirty="0"/>
-              <a:t>[not </a:t>
-            </a:r>
-            <a:r>
-              <a:rPr lang="en-SG" sz="1600" dirty="0">
+              <a:rPr lang="en-SG" sz="1801" dirty="0" smtClean="0"/>
+              <a:t>[</a:t>
+            </a:r>
+            <a:r>
+              <a:rPr lang="en-SG" sz="1600" dirty="0" smtClean="0">
                 <a:latin typeface="Consolas" panose="020B0609020204030204" pitchFamily="49" charset="0"/>
               </a:rPr>
               <a:t>undo</a:t>
             </a:r>
             <a:r>
-              <a:rPr lang="en-SG" sz="1801" dirty="0"/>
-              <a:t> &amp; </a:t>
+              <a:rPr lang="en-SG" sz="1801" dirty="0" smtClean="0"/>
+              <a:t> or </a:t>
             </a:r>
             <a:r>
               <a:rPr lang="en-SG" sz="1600" dirty="0">
@@ -3724,7 +3646,7 @@
           <p:cNvPr id="20" name="TextBox 19">
             <a:extLst>
               <a:ext uri="{FF2B5EF4-FFF2-40B4-BE49-F238E27FC236}">
-                <a16:creationId xmlns:a16="http://schemas.microsoft.com/office/drawing/2014/main" id="{950BB788-4B9F-4654-A5F0-F380DA681824}"/>
+                <a16:creationId xmlns:a16="http://schemas.microsoft.com/office/drawing/2014/main" xmlns="" id="{950BB788-4B9F-4654-A5F0-F380DA681824}"/>
               </a:ext>
             </a:extLst>
           </p:cNvPr>
@@ -3733,7 +3655,7 @@
         </p:nvSpPr>
         <p:spPr>
           <a:xfrm>
-            <a:off x="6311979" y="118233"/>
+            <a:off x="3348788" y="3779313"/>
             <a:ext cx="853127" cy="369460"/>
           </a:xfrm>
           <a:prstGeom prst="rect">
@@ -3759,7 +3681,7 @@
           <p:cNvPr id="22" name="Rectangle: Rounded Corners 21">
             <a:extLst>
               <a:ext uri="{FF2B5EF4-FFF2-40B4-BE49-F238E27FC236}">
-                <a16:creationId xmlns:a16="http://schemas.microsoft.com/office/drawing/2014/main" id="{A323A4FC-FF89-4B75-A4E8-6FA28B7DCA83}"/>
+                <a16:creationId xmlns:a16="http://schemas.microsoft.com/office/drawing/2014/main" xmlns="" id="{A323A4FC-FF89-4B75-A4E8-6FA28B7DCA83}"/>
               </a:ext>
             </a:extLst>
           </p:cNvPr>
@@ -3768,8 +3690,8 @@
         </p:nvSpPr>
         <p:spPr>
           <a:xfrm>
-            <a:off x="4044834" y="1547238"/>
-            <a:ext cx="2187019" cy="527900"/>
+            <a:off x="4111838" y="3491842"/>
+            <a:ext cx="1346134" cy="527900"/>
           </a:xfrm>
           <a:prstGeom prst="roundRect">
             <a:avLst/>
@@ -3806,60 +3728,21 @@
           </a:p>
         </p:txBody>
       </p:sp>
-      <p:cxnSp>
-        <p:nvCxnSpPr>
-          <p:cNvPr id="23" name="Straight Connector 22">
-            <a:extLst>
-              <a:ext uri="{FF2B5EF4-FFF2-40B4-BE49-F238E27FC236}">
-                <a16:creationId xmlns:a16="http://schemas.microsoft.com/office/drawing/2014/main" id="{976EB2B1-1493-46AA-8AF8-DC04DBB508E9}"/>
-              </a:ext>
-            </a:extLst>
-          </p:cNvPr>
-          <p:cNvCxnSpPr>
-            <a:cxnSpLocks/>
-            <a:stCxn id="12" idx="3"/>
-          </p:cNvCxnSpPr>
+      <p:sp>
+        <p:nvSpPr>
+          <p:cNvPr id="26" name="Diamond 25">
+            <a:extLst>
+              <a:ext uri="{FF2B5EF4-FFF2-40B4-BE49-F238E27FC236}">
+                <a16:creationId xmlns:a16="http://schemas.microsoft.com/office/drawing/2014/main" xmlns="" id="{CEFA5E0B-0718-4C33-83E9-398CBD71772D}"/>
+              </a:ext>
+            </a:extLst>
+          </p:cNvPr>
+          <p:cNvSpPr/>
           <p:nvPr/>
-        </p:nvCxnSpPr>
+        </p:nvSpPr>
         <p:spPr>
           <a:xfrm>
-            <a:off x="6311981" y="543282"/>
-            <a:ext cx="539685" cy="0"/>
-          </a:xfrm>
-          <a:prstGeom prst="line">
-            <a:avLst/>
-          </a:prstGeom>
-        </p:spPr>
-        <p:style>
-          <a:lnRef idx="1">
-            <a:schemeClr val="dk1"/>
-          </a:lnRef>
-          <a:fillRef idx="0">
-            <a:schemeClr val="dk1"/>
-          </a:fillRef>
-          <a:effectRef idx="0">
-            <a:schemeClr val="dk1"/>
-          </a:effectRef>
-          <a:fontRef idx="minor">
-            <a:schemeClr val="tx1"/>
-          </a:fontRef>
-        </p:style>
-      </p:cxnSp>
-      <p:sp>
-        <p:nvSpPr>
-          <p:cNvPr id="26" name="Diamond 25">
-            <a:extLst>
-              <a:ext uri="{FF2B5EF4-FFF2-40B4-BE49-F238E27FC236}">
-                <a16:creationId xmlns:a16="http://schemas.microsoft.com/office/drawing/2014/main" id="{CEFA5E0B-0718-4C33-83E9-398CBD71772D}"/>
-              </a:ext>
-            </a:extLst>
-          </p:cNvPr>
-          <p:cNvSpPr/>
-          <p:nvPr/>
-        </p:nvSpPr>
-        <p:spPr>
-          <a:xfrm>
-            <a:off x="5831214" y="2764983"/>
+            <a:off x="5545730" y="3077508"/>
             <a:ext cx="480766" cy="480766"/>
           </a:xfrm>
           <a:prstGeom prst="diamond">
@@ -3894,182 +3777,21 @@
           </a:p>
         </p:txBody>
       </p:sp>
-      <p:cxnSp>
-        <p:nvCxnSpPr>
-          <p:cNvPr id="27" name="Straight Connector 26">
-            <a:extLst>
-              <a:ext uri="{FF2B5EF4-FFF2-40B4-BE49-F238E27FC236}">
-                <a16:creationId xmlns:a16="http://schemas.microsoft.com/office/drawing/2014/main" id="{A5E6814F-A860-451B-9266-310BAEA7CDAC}"/>
-              </a:ext>
-            </a:extLst>
-          </p:cNvPr>
-          <p:cNvCxnSpPr>
-            <a:cxnSpLocks/>
-            <a:stCxn id="22" idx="2"/>
-          </p:cNvCxnSpPr>
+      <p:sp>
+        <p:nvSpPr>
+          <p:cNvPr id="46" name="Diamond 45">
+            <a:extLst>
+              <a:ext uri="{FF2B5EF4-FFF2-40B4-BE49-F238E27FC236}">
+                <a16:creationId xmlns:a16="http://schemas.microsoft.com/office/drawing/2014/main" xmlns="" id="{FDB4A38F-F816-4320-82EB-071E9BA2EFAB}"/>
+              </a:ext>
+            </a:extLst>
+          </p:cNvPr>
+          <p:cNvSpPr/>
           <p:nvPr/>
-        </p:nvCxnSpPr>
-        <p:spPr>
-          <a:xfrm flipH="1">
-            <a:off x="5138342" y="2075138"/>
-            <a:ext cx="2" cy="930226"/>
-          </a:xfrm>
-          <a:prstGeom prst="line">
-            <a:avLst/>
-          </a:prstGeom>
-        </p:spPr>
-        <p:style>
-          <a:lnRef idx="1">
-            <a:schemeClr val="dk1"/>
-          </a:lnRef>
-          <a:fillRef idx="0">
-            <a:schemeClr val="dk1"/>
-          </a:fillRef>
-          <a:effectRef idx="0">
-            <a:schemeClr val="dk1"/>
-          </a:effectRef>
-          <a:fontRef idx="minor">
-            <a:schemeClr val="tx1"/>
-          </a:fontRef>
-        </p:style>
-      </p:cxnSp>
-      <p:cxnSp>
-        <p:nvCxnSpPr>
-          <p:cNvPr id="30" name="Straight Arrow Connector 29">
-            <a:extLst>
-              <a:ext uri="{FF2B5EF4-FFF2-40B4-BE49-F238E27FC236}">
-                <a16:creationId xmlns:a16="http://schemas.microsoft.com/office/drawing/2014/main" id="{75BF4C25-08E7-45D9-B119-9B95A28731D1}"/>
-              </a:ext>
-            </a:extLst>
-          </p:cNvPr>
-          <p:cNvCxnSpPr>
-            <a:cxnSpLocks/>
-            <a:endCxn id="26" idx="1"/>
-          </p:cNvCxnSpPr>
-          <p:nvPr/>
-        </p:nvCxnSpPr>
+        </p:nvSpPr>
         <p:spPr>
           <a:xfrm>
-            <a:off x="5138342" y="3005365"/>
-            <a:ext cx="692871" cy="2"/>
-          </a:xfrm>
-          <a:prstGeom prst="straightConnector1">
-            <a:avLst/>
-          </a:prstGeom>
-          <a:ln>
-            <a:tailEnd type="triangle"/>
-          </a:ln>
-        </p:spPr>
-        <p:style>
-          <a:lnRef idx="1">
-            <a:schemeClr val="dk1"/>
-          </a:lnRef>
-          <a:fillRef idx="0">
-            <a:schemeClr val="dk1"/>
-          </a:fillRef>
-          <a:effectRef idx="0">
-            <a:schemeClr val="dk1"/>
-          </a:effectRef>
-          <a:fontRef idx="minor">
-            <a:schemeClr val="tx1"/>
-          </a:fontRef>
-        </p:style>
-      </p:cxnSp>
-      <p:cxnSp>
-        <p:nvCxnSpPr>
-          <p:cNvPr id="36" name="Straight Connector 35">
-            <a:extLst>
-              <a:ext uri="{FF2B5EF4-FFF2-40B4-BE49-F238E27FC236}">
-                <a16:creationId xmlns:a16="http://schemas.microsoft.com/office/drawing/2014/main" id="{98847C5E-DAA5-4B06-82D4-86A7D99EB069}"/>
-              </a:ext>
-            </a:extLst>
-          </p:cNvPr>
-          <p:cNvCxnSpPr>
-            <a:cxnSpLocks/>
-          </p:cNvCxnSpPr>
-          <p:nvPr/>
-        </p:nvCxnSpPr>
-        <p:spPr>
-          <a:xfrm>
-            <a:off x="6851664" y="541596"/>
-            <a:ext cx="0" cy="2462082"/>
-          </a:xfrm>
-          <a:prstGeom prst="line">
-            <a:avLst/>
-          </a:prstGeom>
-        </p:spPr>
-        <p:style>
-          <a:lnRef idx="1">
-            <a:schemeClr val="dk1"/>
-          </a:lnRef>
-          <a:fillRef idx="0">
-            <a:schemeClr val="dk1"/>
-          </a:fillRef>
-          <a:effectRef idx="0">
-            <a:schemeClr val="dk1"/>
-          </a:effectRef>
-          <a:fontRef idx="minor">
-            <a:schemeClr val="tx1"/>
-          </a:fontRef>
-        </p:style>
-      </p:cxnSp>
-      <p:cxnSp>
-        <p:nvCxnSpPr>
-          <p:cNvPr id="39" name="Straight Arrow Connector 38">
-            <a:extLst>
-              <a:ext uri="{FF2B5EF4-FFF2-40B4-BE49-F238E27FC236}">
-                <a16:creationId xmlns:a16="http://schemas.microsoft.com/office/drawing/2014/main" id="{07205C61-8174-4C37-BC30-E1E54EBEAF6C}"/>
-              </a:ext>
-            </a:extLst>
-          </p:cNvPr>
-          <p:cNvCxnSpPr>
-            <a:cxnSpLocks/>
-            <a:endCxn id="26" idx="3"/>
-          </p:cNvCxnSpPr>
-          <p:nvPr/>
-        </p:nvCxnSpPr>
-        <p:spPr>
-          <a:xfrm flipH="1">
-            <a:off x="6311981" y="3003679"/>
-            <a:ext cx="539685" cy="1687"/>
-          </a:xfrm>
-          <a:prstGeom prst="straightConnector1">
-            <a:avLst/>
-          </a:prstGeom>
-          <a:ln>
-            <a:tailEnd type="triangle"/>
-          </a:ln>
-        </p:spPr>
-        <p:style>
-          <a:lnRef idx="1">
-            <a:schemeClr val="dk1"/>
-          </a:lnRef>
-          <a:fillRef idx="0">
-            <a:schemeClr val="dk1"/>
-          </a:fillRef>
-          <a:effectRef idx="0">
-            <a:schemeClr val="dk1"/>
-          </a:effectRef>
-          <a:fontRef idx="minor">
-            <a:schemeClr val="tx1"/>
-          </a:fontRef>
-        </p:style>
-      </p:cxnSp>
-      <p:sp>
-        <p:nvSpPr>
-          <p:cNvPr id="46" name="Diamond 45">
-            <a:extLst>
-              <a:ext uri="{FF2B5EF4-FFF2-40B4-BE49-F238E27FC236}">
-                <a16:creationId xmlns:a16="http://schemas.microsoft.com/office/drawing/2014/main" id="{FDB4A38F-F816-4320-82EB-071E9BA2EFAB}"/>
-              </a:ext>
-            </a:extLst>
-          </p:cNvPr>
-          <p:cNvSpPr/>
-          <p:nvPr/>
-        </p:nvSpPr>
-        <p:spPr>
-          <a:xfrm>
-            <a:off x="5874002" y="6274248"/>
+            <a:off x="9058495" y="3067868"/>
             <a:ext cx="480766" cy="480766"/>
           </a:xfrm>
           <a:prstGeom prst="diamond">
@@ -4109,7 +3831,7 @@
           <p:cNvPr id="47" name="TextBox 46">
             <a:extLst>
               <a:ext uri="{FF2B5EF4-FFF2-40B4-BE49-F238E27FC236}">
-                <a16:creationId xmlns:a16="http://schemas.microsoft.com/office/drawing/2014/main" id="{791A7435-1CBD-4D64-B373-CDF617409EFD}"/>
+                <a16:creationId xmlns:a16="http://schemas.microsoft.com/office/drawing/2014/main" xmlns="" id="{791A7435-1CBD-4D64-B373-CDF617409EFD}"/>
               </a:ext>
             </a:extLst>
           </p:cNvPr>
@@ -4118,7 +3840,7 @@
         </p:nvSpPr>
         <p:spPr>
           <a:xfrm>
-            <a:off x="6231853" y="3635003"/>
+            <a:off x="6698741" y="3423880"/>
             <a:ext cx="853127" cy="369460"/>
           </a:xfrm>
           <a:prstGeom prst="rect">
@@ -4144,7 +3866,7 @@
           <p:cNvPr id="48" name="TextBox 47">
             <a:extLst>
               <a:ext uri="{FF2B5EF4-FFF2-40B4-BE49-F238E27FC236}">
-                <a16:creationId xmlns:a16="http://schemas.microsoft.com/office/drawing/2014/main" id="{300470AD-DA4C-4F16-91F5-E3E560CDBEFC}"/>
+                <a16:creationId xmlns:a16="http://schemas.microsoft.com/office/drawing/2014/main" xmlns="" id="{300470AD-DA4C-4F16-91F5-E3E560CDBEFC}"/>
               </a:ext>
             </a:extLst>
           </p:cNvPr>
@@ -4153,7 +3875,7 @@
         </p:nvSpPr>
         <p:spPr>
           <a:xfrm>
-            <a:off x="4581755" y="3404427"/>
+            <a:off x="5959708" y="2313924"/>
             <a:ext cx="1414021" cy="646587"/>
           </a:xfrm>
           <a:prstGeom prst="rect">
@@ -4174,102 +3896,22 @@
           </a:p>
         </p:txBody>
       </p:sp>
-      <p:cxnSp>
-        <p:nvCxnSpPr>
-          <p:cNvPr id="49" name="Straight Connector 48">
-            <a:extLst>
-              <a:ext uri="{FF2B5EF4-FFF2-40B4-BE49-F238E27FC236}">
-                <a16:creationId xmlns:a16="http://schemas.microsoft.com/office/drawing/2014/main" id="{3AE9CE8A-80E1-4D09-9F84-E25B9A8DAF68}"/>
-              </a:ext>
-            </a:extLst>
-          </p:cNvPr>
-          <p:cNvCxnSpPr>
-            <a:cxnSpLocks/>
-            <a:stCxn id="56" idx="3"/>
-          </p:cNvCxnSpPr>
+      <p:sp>
+        <p:nvSpPr>
+          <p:cNvPr id="51" name="Rectangle: Rounded Corners 50">
+            <a:extLst>
+              <a:ext uri="{FF2B5EF4-FFF2-40B4-BE49-F238E27FC236}">
+                <a16:creationId xmlns:a16="http://schemas.microsoft.com/office/drawing/2014/main" xmlns="" id="{D62D81FC-C644-4602-90C8-B7974D14CA54}"/>
+              </a:ext>
+            </a:extLst>
+          </p:cNvPr>
+          <p:cNvSpPr/>
           <p:nvPr/>
-        </p:nvCxnSpPr>
+        </p:nvSpPr>
         <p:spPr>
           <a:xfrm>
-            <a:off x="6311978" y="4054768"/>
-            <a:ext cx="542446" cy="0"/>
-          </a:xfrm>
-          <a:prstGeom prst="line">
-            <a:avLst/>
-          </a:prstGeom>
-        </p:spPr>
-        <p:style>
-          <a:lnRef idx="1">
-            <a:schemeClr val="dk1"/>
-          </a:lnRef>
-          <a:fillRef idx="0">
-            <a:schemeClr val="dk1"/>
-          </a:fillRef>
-          <a:effectRef idx="0">
-            <a:schemeClr val="dk1"/>
-          </a:effectRef>
-          <a:fontRef idx="minor">
-            <a:schemeClr val="tx1"/>
-          </a:fontRef>
-        </p:style>
-      </p:cxnSp>
-      <p:cxnSp>
-        <p:nvCxnSpPr>
-          <p:cNvPr id="50" name="Straight Arrow Connector 49">
-            <a:extLst>
-              <a:ext uri="{FF2B5EF4-FFF2-40B4-BE49-F238E27FC236}">
-                <a16:creationId xmlns:a16="http://schemas.microsoft.com/office/drawing/2014/main" id="{93890486-74D2-45FF-A307-364928250438}"/>
-              </a:ext>
-            </a:extLst>
-          </p:cNvPr>
-          <p:cNvCxnSpPr>
-            <a:cxnSpLocks/>
-          </p:cNvCxnSpPr>
-          <p:nvPr/>
-        </p:nvCxnSpPr>
-        <p:spPr>
-          <a:xfrm flipH="1">
-            <a:off x="5288764" y="4056832"/>
-            <a:ext cx="1" cy="1225223"/>
-          </a:xfrm>
-          <a:prstGeom prst="straightConnector1">
-            <a:avLst/>
-          </a:prstGeom>
-          <a:ln>
-            <a:tailEnd type="triangle"/>
-          </a:ln>
-        </p:spPr>
-        <p:style>
-          <a:lnRef idx="1">
-            <a:schemeClr val="dk1"/>
-          </a:lnRef>
-          <a:fillRef idx="0">
-            <a:schemeClr val="dk1"/>
-          </a:fillRef>
-          <a:effectRef idx="0">
-            <a:schemeClr val="dk1"/>
-          </a:effectRef>
-          <a:fontRef idx="minor">
-            <a:schemeClr val="tx1"/>
-          </a:fontRef>
-        </p:style>
-      </p:cxnSp>
-      <p:sp>
-        <p:nvSpPr>
-          <p:cNvPr id="51" name="Rectangle: Rounded Corners 50">
-            <a:extLst>
-              <a:ext uri="{FF2B5EF4-FFF2-40B4-BE49-F238E27FC236}">
-                <a16:creationId xmlns:a16="http://schemas.microsoft.com/office/drawing/2014/main" id="{D62D81FC-C644-4602-90C8-B7974D14CA54}"/>
-              </a:ext>
-            </a:extLst>
-          </p:cNvPr>
-          <p:cNvSpPr/>
-          <p:nvPr/>
-        </p:nvSpPr>
-        <p:spPr>
-          <a:xfrm>
-            <a:off x="4358274" y="5282055"/>
-            <a:ext cx="1873579" cy="646330"/>
+            <a:off x="7188198" y="2606729"/>
+            <a:ext cx="1634410" cy="646330"/>
           </a:xfrm>
           <a:prstGeom prst="roundRect">
             <a:avLst/>
@@ -4306,139 +3948,21 @@
           </a:p>
         </p:txBody>
       </p:sp>
-      <p:cxnSp>
-        <p:nvCxnSpPr>
-          <p:cNvPr id="52" name="Straight Connector 51">
-            <a:extLst>
-              <a:ext uri="{FF2B5EF4-FFF2-40B4-BE49-F238E27FC236}">
-                <a16:creationId xmlns:a16="http://schemas.microsoft.com/office/drawing/2014/main" id="{4E0125F5-2933-475D-8E22-23FB92F10BB9}"/>
-              </a:ext>
-            </a:extLst>
-          </p:cNvPr>
-          <p:cNvCxnSpPr>
-            <a:cxnSpLocks/>
-            <a:endCxn id="56" idx="1"/>
-          </p:cNvCxnSpPr>
+      <p:sp>
+        <p:nvSpPr>
+          <p:cNvPr id="56" name="Diamond 55">
+            <a:extLst>
+              <a:ext uri="{FF2B5EF4-FFF2-40B4-BE49-F238E27FC236}">
+                <a16:creationId xmlns:a16="http://schemas.microsoft.com/office/drawing/2014/main" xmlns="" id="{0ACD7DC4-F31E-42B2-9D34-41B1AE997EB1}"/>
+              </a:ext>
+            </a:extLst>
+          </p:cNvPr>
+          <p:cNvSpPr/>
           <p:nvPr/>
-        </p:nvCxnSpPr>
+        </p:nvSpPr>
         <p:spPr>
           <a:xfrm>
-            <a:off x="5294728" y="4052583"/>
-            <a:ext cx="536484" cy="2185"/>
-          </a:xfrm>
-          <a:prstGeom prst="line">
-            <a:avLst/>
-          </a:prstGeom>
-        </p:spPr>
-        <p:style>
-          <a:lnRef idx="1">
-            <a:schemeClr val="dk1"/>
-          </a:lnRef>
-          <a:fillRef idx="0">
-            <a:schemeClr val="dk1"/>
-          </a:fillRef>
-          <a:effectRef idx="0">
-            <a:schemeClr val="dk1"/>
-          </a:effectRef>
-          <a:fontRef idx="minor">
-            <a:schemeClr val="tx1"/>
-          </a:fontRef>
-        </p:style>
-      </p:cxnSp>
-      <p:cxnSp>
-        <p:nvCxnSpPr>
-          <p:cNvPr id="53" name="Straight Connector 52">
-            <a:extLst>
-              <a:ext uri="{FF2B5EF4-FFF2-40B4-BE49-F238E27FC236}">
-                <a16:creationId xmlns:a16="http://schemas.microsoft.com/office/drawing/2014/main" id="{CB79C1E5-CFA9-408B-95DD-38477A84EB23}"/>
-              </a:ext>
-            </a:extLst>
-          </p:cNvPr>
-          <p:cNvCxnSpPr>
-            <a:cxnSpLocks/>
-          </p:cNvCxnSpPr>
-          <p:nvPr/>
-        </p:nvCxnSpPr>
-        <p:spPr>
-          <a:xfrm>
-            <a:off x="6851664" y="4051014"/>
-            <a:ext cx="0" cy="2462082"/>
-          </a:xfrm>
-          <a:prstGeom prst="line">
-            <a:avLst/>
-          </a:prstGeom>
-        </p:spPr>
-        <p:style>
-          <a:lnRef idx="1">
-            <a:schemeClr val="dk1"/>
-          </a:lnRef>
-          <a:fillRef idx="0">
-            <a:schemeClr val="dk1"/>
-          </a:fillRef>
-          <a:effectRef idx="0">
-            <a:schemeClr val="dk1"/>
-          </a:effectRef>
-          <a:fontRef idx="minor">
-            <a:schemeClr val="tx1"/>
-          </a:fontRef>
-        </p:style>
-      </p:cxnSp>
-      <p:cxnSp>
-        <p:nvCxnSpPr>
-          <p:cNvPr id="54" name="Straight Arrow Connector 53">
-            <a:extLst>
-              <a:ext uri="{FF2B5EF4-FFF2-40B4-BE49-F238E27FC236}">
-                <a16:creationId xmlns:a16="http://schemas.microsoft.com/office/drawing/2014/main" id="{AE0F687C-662C-4955-B0CF-562209CBC177}"/>
-              </a:ext>
-            </a:extLst>
-          </p:cNvPr>
-          <p:cNvCxnSpPr>
-            <a:cxnSpLocks/>
-          </p:cNvCxnSpPr>
-          <p:nvPr/>
-        </p:nvCxnSpPr>
-        <p:spPr>
-          <a:xfrm flipH="1">
-            <a:off x="6354768" y="6513096"/>
-            <a:ext cx="496896" cy="0"/>
-          </a:xfrm>
-          <a:prstGeom prst="straightConnector1">
-            <a:avLst/>
-          </a:prstGeom>
-          <a:ln>
-            <a:tailEnd type="triangle"/>
-          </a:ln>
-        </p:spPr>
-        <p:style>
-          <a:lnRef idx="1">
-            <a:schemeClr val="dk1"/>
-          </a:lnRef>
-          <a:fillRef idx="0">
-            <a:schemeClr val="dk1"/>
-          </a:fillRef>
-          <a:effectRef idx="0">
-            <a:schemeClr val="dk1"/>
-          </a:effectRef>
-          <a:fontRef idx="minor">
-            <a:schemeClr val="tx1"/>
-          </a:fontRef>
-        </p:style>
-      </p:cxnSp>
-      <p:sp>
-        <p:nvSpPr>
-          <p:cNvPr id="56" name="Diamond 55">
-            <a:extLst>
-              <a:ext uri="{FF2B5EF4-FFF2-40B4-BE49-F238E27FC236}">
-                <a16:creationId xmlns:a16="http://schemas.microsoft.com/office/drawing/2014/main" id="{0ACD7DC4-F31E-42B2-9D34-41B1AE997EB1}"/>
-              </a:ext>
-            </a:extLst>
-          </p:cNvPr>
-          <p:cNvSpPr/>
-          <p:nvPr/>
-        </p:nvSpPr>
-        <p:spPr>
-          <a:xfrm>
-            <a:off x="5831212" y="3814385"/>
+            <a:off x="6253122" y="3075397"/>
             <a:ext cx="480766" cy="480766"/>
           </a:xfrm>
           <a:prstGeom prst="diamond">
@@ -4475,145 +3999,24 @@
       </p:sp>
       <p:cxnSp>
         <p:nvCxnSpPr>
-          <p:cNvPr id="58" name="Straight Connector 57">
-            <a:extLst>
-              <a:ext uri="{FF2B5EF4-FFF2-40B4-BE49-F238E27FC236}">
-                <a16:creationId xmlns:a16="http://schemas.microsoft.com/office/drawing/2014/main" id="{1321E06C-BD3F-48BC-B492-E9A960F6A4C8}"/>
+          <p:cNvPr id="69" name="Straight Arrow Connector 68">
+            <a:extLst>
+              <a:ext uri="{FF2B5EF4-FFF2-40B4-BE49-F238E27FC236}">
+                <a16:creationId xmlns:a16="http://schemas.microsoft.com/office/drawing/2014/main" xmlns="" id="{7BE2639B-14BA-4C9C-9964-899CEF3278C9}"/>
               </a:ext>
             </a:extLst>
           </p:cNvPr>
           <p:cNvCxnSpPr>
             <a:cxnSpLocks/>
+            <a:stCxn id="46" idx="3"/>
+            <a:endCxn id="68" idx="2"/>
           </p:cNvCxnSpPr>
           <p:nvPr/>
         </p:nvCxnSpPr>
         <p:spPr>
           <a:xfrm>
-            <a:off x="5288764" y="5928385"/>
-            <a:ext cx="0" cy="584711"/>
-          </a:xfrm>
-          <a:prstGeom prst="line">
-            <a:avLst/>
-          </a:prstGeom>
-        </p:spPr>
-        <p:style>
-          <a:lnRef idx="1">
-            <a:schemeClr val="dk1"/>
-          </a:lnRef>
-          <a:fillRef idx="0">
-            <a:schemeClr val="dk1"/>
-          </a:fillRef>
-          <a:effectRef idx="0">
-            <a:schemeClr val="dk1"/>
-          </a:effectRef>
-          <a:fontRef idx="minor">
-            <a:schemeClr val="tx1"/>
-          </a:fontRef>
-        </p:style>
-      </p:cxnSp>
-      <p:cxnSp>
-        <p:nvCxnSpPr>
-          <p:cNvPr id="59" name="Straight Arrow Connector 58">
-            <a:extLst>
-              <a:ext uri="{FF2B5EF4-FFF2-40B4-BE49-F238E27FC236}">
-                <a16:creationId xmlns:a16="http://schemas.microsoft.com/office/drawing/2014/main" id="{CD1E2DBC-0139-4003-ADA5-A30804607F85}"/>
-              </a:ext>
-            </a:extLst>
-          </p:cNvPr>
-          <p:cNvCxnSpPr>
-            <a:cxnSpLocks/>
-          </p:cNvCxnSpPr>
-          <p:nvPr/>
-        </p:nvCxnSpPr>
-        <p:spPr>
-          <a:xfrm>
-            <a:off x="5288764" y="6513129"/>
-            <a:ext cx="614040" cy="0"/>
-          </a:xfrm>
-          <a:prstGeom prst="straightConnector1">
-            <a:avLst/>
-          </a:prstGeom>
-          <a:ln>
-            <a:tailEnd type="triangle"/>
-          </a:ln>
-        </p:spPr>
-        <p:style>
-          <a:lnRef idx="1">
-            <a:schemeClr val="dk1"/>
-          </a:lnRef>
-          <a:fillRef idx="0">
-            <a:schemeClr val="dk1"/>
-          </a:fillRef>
-          <a:effectRef idx="0">
-            <a:schemeClr val="dk1"/>
-          </a:effectRef>
-          <a:fontRef idx="minor">
-            <a:schemeClr val="tx1"/>
-          </a:fontRef>
-        </p:style>
-      </p:cxnSp>
-      <p:cxnSp>
-        <p:nvCxnSpPr>
-          <p:cNvPr id="65" name="Straight Arrow Connector 64">
-            <a:extLst>
-              <a:ext uri="{FF2B5EF4-FFF2-40B4-BE49-F238E27FC236}">
-                <a16:creationId xmlns:a16="http://schemas.microsoft.com/office/drawing/2014/main" id="{F19B7A29-4E76-4FF6-AB20-F964D8CE510E}"/>
-              </a:ext>
-            </a:extLst>
-          </p:cNvPr>
-          <p:cNvCxnSpPr>
-            <a:cxnSpLocks/>
-            <a:stCxn id="26" idx="2"/>
-            <a:endCxn id="56" idx="0"/>
-          </p:cNvCxnSpPr>
-          <p:nvPr/>
-        </p:nvCxnSpPr>
-        <p:spPr>
-          <a:xfrm flipH="1">
-            <a:off x="6071595" y="3245749"/>
-            <a:ext cx="2" cy="568636"/>
-          </a:xfrm>
-          <a:prstGeom prst="straightConnector1">
-            <a:avLst/>
-          </a:prstGeom>
-          <a:ln>
-            <a:tailEnd type="triangle"/>
-          </a:ln>
-        </p:spPr>
-        <p:style>
-          <a:lnRef idx="1">
-            <a:schemeClr val="dk1"/>
-          </a:lnRef>
-          <a:fillRef idx="0">
-            <a:schemeClr val="dk1"/>
-          </a:fillRef>
-          <a:effectRef idx="0">
-            <a:schemeClr val="dk1"/>
-          </a:effectRef>
-          <a:fontRef idx="minor">
-            <a:schemeClr val="tx1"/>
-          </a:fontRef>
-        </p:style>
-      </p:cxnSp>
-      <p:cxnSp>
-        <p:nvCxnSpPr>
-          <p:cNvPr id="69" name="Straight Arrow Connector 68">
-            <a:extLst>
-              <a:ext uri="{FF2B5EF4-FFF2-40B4-BE49-F238E27FC236}">
-                <a16:creationId xmlns:a16="http://schemas.microsoft.com/office/drawing/2014/main" id="{7BE2639B-14BA-4C9C-9964-899CEF3278C9}"/>
-              </a:ext>
-            </a:extLst>
-          </p:cNvPr>
-          <p:cNvCxnSpPr>
-            <a:cxnSpLocks/>
-            <a:stCxn id="46" idx="2"/>
-          </p:cNvCxnSpPr>
-          <p:nvPr/>
-        </p:nvCxnSpPr>
-        <p:spPr>
-          <a:xfrm>
-            <a:off x="6114385" y="6755014"/>
-            <a:ext cx="0" cy="747054"/>
+            <a:off x="9539261" y="3308251"/>
+            <a:ext cx="419377" cy="7529"/>
           </a:xfrm>
           <a:prstGeom prst="straightConnector1">
             <a:avLst/>
@@ -4642,7 +4045,7 @@
           <p:cNvPr id="75" name="Group 74">
             <a:extLst>
               <a:ext uri="{FF2B5EF4-FFF2-40B4-BE49-F238E27FC236}">
-                <a16:creationId xmlns:a16="http://schemas.microsoft.com/office/drawing/2014/main" id="{A48F4168-7D41-4ED6-97F1-58289DDE3C4D}"/>
+                <a16:creationId xmlns:a16="http://schemas.microsoft.com/office/drawing/2014/main" xmlns="" id="{A48F4168-7D41-4ED6-97F1-58289DDE3C4D}"/>
               </a:ext>
             </a:extLst>
           </p:cNvPr>
@@ -4651,7 +4054,7 @@
         </p:nvGrpSpPr>
         <p:grpSpPr>
           <a:xfrm>
-            <a:off x="5996550" y="7502068"/>
+            <a:off x="9958638" y="3197945"/>
             <a:ext cx="235669" cy="235669"/>
             <a:chOff x="8040730" y="5082186"/>
             <a:chExt cx="235669" cy="235669"/>
@@ -4662,7 +4065,7 @@
             <p:cNvPr id="68" name="Oval 67">
               <a:extLst>
                 <a:ext uri="{FF2B5EF4-FFF2-40B4-BE49-F238E27FC236}">
-                  <a16:creationId xmlns:a16="http://schemas.microsoft.com/office/drawing/2014/main" id="{E423C8D7-553D-4A16-BA68-78DB113CAEC3}"/>
+                  <a16:creationId xmlns:a16="http://schemas.microsoft.com/office/drawing/2014/main" xmlns="" id="{E423C8D7-553D-4A16-BA68-78DB113CAEC3}"/>
                 </a:ext>
               </a:extLst>
             </p:cNvPr>
@@ -4714,7 +4117,7 @@
             <p:cNvPr id="71" name="Oval 70">
               <a:extLst>
                 <a:ext uri="{FF2B5EF4-FFF2-40B4-BE49-F238E27FC236}">
-                  <a16:creationId xmlns:a16="http://schemas.microsoft.com/office/drawing/2014/main" id="{1F41AA13-1BFC-498E-BBC4-DC32053E38E1}"/>
+                  <a16:creationId xmlns:a16="http://schemas.microsoft.com/office/drawing/2014/main" xmlns="" id="{1F41AA13-1BFC-498E-BBC4-DC32053E38E1}"/>
                 </a:ext>
               </a:extLst>
             </p:cNvPr>
@@ -4759,6 +4162,264 @@
           </p:txBody>
         </p:sp>
       </p:grpSp>
+      <p:cxnSp>
+        <p:nvCxnSpPr>
+          <p:cNvPr id="24" name="Elbow Connector 23"/>
+          <p:cNvCxnSpPr>
+            <a:stCxn id="12" idx="2"/>
+            <a:endCxn id="22" idx="1"/>
+          </p:cNvCxnSpPr>
+          <p:nvPr/>
+        </p:nvCxnSpPr>
+        <p:spPr>
+          <a:xfrm rot="16200000" flipH="1">
+            <a:off x="3849008" y="3492962"/>
+            <a:ext cx="197518" cy="328141"/>
+          </a:xfrm>
+          <a:prstGeom prst="bentConnector2">
+            <a:avLst/>
+          </a:prstGeom>
+          <a:ln>
+            <a:tailEnd type="triangle"/>
+          </a:ln>
+        </p:spPr>
+        <p:style>
+          <a:lnRef idx="1">
+            <a:schemeClr val="dk1"/>
+          </a:lnRef>
+          <a:fillRef idx="0">
+            <a:schemeClr val="dk1"/>
+          </a:fillRef>
+          <a:effectRef idx="0">
+            <a:schemeClr val="dk1"/>
+          </a:effectRef>
+          <a:fontRef idx="minor">
+            <a:schemeClr val="tx1"/>
+          </a:fontRef>
+        </p:style>
+      </p:cxnSp>
+      <p:cxnSp>
+        <p:nvCxnSpPr>
+          <p:cNvPr id="55" name="Elbow Connector 54"/>
+          <p:cNvCxnSpPr>
+            <a:stCxn id="12" idx="0"/>
+            <a:endCxn id="26" idx="0"/>
+          </p:cNvCxnSpPr>
+          <p:nvPr/>
+        </p:nvCxnSpPr>
+        <p:spPr>
+          <a:xfrm rot="5400000" flipH="1" flipV="1">
+            <a:off x="4784905" y="2076300"/>
+            <a:ext cx="12700" cy="2002416"/>
+          </a:xfrm>
+          <a:prstGeom prst="bentConnector3">
+            <a:avLst>
+              <a:gd name="adj1" fmla="val 1800000"/>
+            </a:avLst>
+          </a:prstGeom>
+          <a:ln>
+            <a:tailEnd type="triangle"/>
+          </a:ln>
+        </p:spPr>
+        <p:style>
+          <a:lnRef idx="1">
+            <a:schemeClr val="dk1"/>
+          </a:lnRef>
+          <a:fillRef idx="0">
+            <a:schemeClr val="dk1"/>
+          </a:fillRef>
+          <a:effectRef idx="0">
+            <a:schemeClr val="dk1"/>
+          </a:effectRef>
+          <a:fontRef idx="minor">
+            <a:schemeClr val="tx1"/>
+          </a:fontRef>
+        </p:style>
+      </p:cxnSp>
+      <p:cxnSp>
+        <p:nvCxnSpPr>
+          <p:cNvPr id="57" name="Elbow Connector 56"/>
+          <p:cNvCxnSpPr>
+            <a:stCxn id="22" idx="3"/>
+            <a:endCxn id="26" idx="2"/>
+          </p:cNvCxnSpPr>
+          <p:nvPr/>
+        </p:nvCxnSpPr>
+        <p:spPr>
+          <a:xfrm flipV="1">
+            <a:off x="5457972" y="3558274"/>
+            <a:ext cx="328141" cy="197518"/>
+          </a:xfrm>
+          <a:prstGeom prst="bentConnector2">
+            <a:avLst/>
+          </a:prstGeom>
+          <a:ln>
+            <a:tailEnd type="triangle"/>
+          </a:ln>
+        </p:spPr>
+        <p:style>
+          <a:lnRef idx="1">
+            <a:schemeClr val="dk1"/>
+          </a:lnRef>
+          <a:fillRef idx="0">
+            <a:schemeClr val="dk1"/>
+          </a:fillRef>
+          <a:effectRef idx="0">
+            <a:schemeClr val="dk1"/>
+          </a:effectRef>
+          <a:fontRef idx="minor">
+            <a:schemeClr val="tx1"/>
+          </a:fontRef>
+        </p:style>
+      </p:cxnSp>
+      <p:cxnSp>
+        <p:nvCxnSpPr>
+          <p:cNvPr id="61" name="Elbow Connector 60"/>
+          <p:cNvCxnSpPr>
+            <a:stCxn id="26" idx="3"/>
+            <a:endCxn id="56" idx="1"/>
+          </p:cNvCxnSpPr>
+          <p:nvPr/>
+        </p:nvCxnSpPr>
+        <p:spPr>
+          <a:xfrm flipV="1">
+            <a:off x="6026496" y="3315780"/>
+            <a:ext cx="226626" cy="2111"/>
+          </a:xfrm>
+          <a:prstGeom prst="bentConnector3">
+            <a:avLst>
+              <a:gd name="adj1" fmla="val 50000"/>
+            </a:avLst>
+          </a:prstGeom>
+          <a:ln>
+            <a:tailEnd type="triangle"/>
+          </a:ln>
+        </p:spPr>
+        <p:style>
+          <a:lnRef idx="1">
+            <a:schemeClr val="dk1"/>
+          </a:lnRef>
+          <a:fillRef idx="0">
+            <a:schemeClr val="dk1"/>
+          </a:fillRef>
+          <a:effectRef idx="0">
+            <a:schemeClr val="dk1"/>
+          </a:effectRef>
+          <a:fontRef idx="minor">
+            <a:schemeClr val="tx1"/>
+          </a:fontRef>
+        </p:style>
+      </p:cxnSp>
+      <p:cxnSp>
+        <p:nvCxnSpPr>
+          <p:cNvPr id="66" name="Elbow Connector 65"/>
+          <p:cNvCxnSpPr>
+            <a:stCxn id="56" idx="0"/>
+            <a:endCxn id="51" idx="1"/>
+          </p:cNvCxnSpPr>
+          <p:nvPr/>
+        </p:nvCxnSpPr>
+        <p:spPr>
+          <a:xfrm rot="5400000" flipH="1" flipV="1">
+            <a:off x="6768100" y="2655300"/>
+            <a:ext cx="145503" cy="694693"/>
+          </a:xfrm>
+          <a:prstGeom prst="bentConnector2">
+            <a:avLst/>
+          </a:prstGeom>
+          <a:ln>
+            <a:tailEnd type="triangle"/>
+          </a:ln>
+        </p:spPr>
+        <p:style>
+          <a:lnRef idx="1">
+            <a:schemeClr val="dk1"/>
+          </a:lnRef>
+          <a:fillRef idx="0">
+            <a:schemeClr val="dk1"/>
+          </a:fillRef>
+          <a:effectRef idx="0">
+            <a:schemeClr val="dk1"/>
+          </a:effectRef>
+          <a:fontRef idx="minor">
+            <a:schemeClr val="tx1"/>
+          </a:fontRef>
+        </p:style>
+      </p:cxnSp>
+      <p:cxnSp>
+        <p:nvCxnSpPr>
+          <p:cNvPr id="72" name="Elbow Connector 71"/>
+          <p:cNvCxnSpPr>
+            <a:stCxn id="56" idx="2"/>
+            <a:endCxn id="46" idx="2"/>
+          </p:cNvCxnSpPr>
+          <p:nvPr/>
+        </p:nvCxnSpPr>
+        <p:spPr>
+          <a:xfrm rot="5400000" flipH="1" flipV="1">
+            <a:off x="7892426" y="2149712"/>
+            <a:ext cx="7529" cy="2805373"/>
+          </a:xfrm>
+          <a:prstGeom prst="bentConnector3">
+            <a:avLst>
+              <a:gd name="adj1" fmla="val -3036260"/>
+            </a:avLst>
+          </a:prstGeom>
+          <a:ln>
+            <a:tailEnd type="triangle"/>
+          </a:ln>
+        </p:spPr>
+        <p:style>
+          <a:lnRef idx="1">
+            <a:schemeClr val="dk1"/>
+          </a:lnRef>
+          <a:fillRef idx="0">
+            <a:schemeClr val="dk1"/>
+          </a:fillRef>
+          <a:effectRef idx="0">
+            <a:schemeClr val="dk1"/>
+          </a:effectRef>
+          <a:fontRef idx="minor">
+            <a:schemeClr val="tx1"/>
+          </a:fontRef>
+        </p:style>
+      </p:cxnSp>
+      <p:cxnSp>
+        <p:nvCxnSpPr>
+          <p:cNvPr id="74" name="Elbow Connector 73"/>
+          <p:cNvCxnSpPr>
+            <a:stCxn id="51" idx="3"/>
+            <a:endCxn id="46" idx="0"/>
+          </p:cNvCxnSpPr>
+          <p:nvPr/>
+        </p:nvCxnSpPr>
+        <p:spPr>
+          <a:xfrm>
+            <a:off x="8822608" y="2929894"/>
+            <a:ext cx="476270" cy="137974"/>
+          </a:xfrm>
+          <a:prstGeom prst="bentConnector2">
+            <a:avLst/>
+          </a:prstGeom>
+          <a:ln>
+            <a:tailEnd type="triangle"/>
+          </a:ln>
+        </p:spPr>
+        <p:style>
+          <a:lnRef idx="1">
+            <a:schemeClr val="dk1"/>
+          </a:lnRef>
+          <a:fillRef idx="0">
+            <a:schemeClr val="dk1"/>
+          </a:fillRef>
+          <a:effectRef idx="0">
+            <a:schemeClr val="dk1"/>
+          </a:effectRef>
+          <a:fontRef idx="minor">
+            <a:schemeClr val="tx1"/>
+          </a:fontRef>
+        </p:style>
+      </p:cxnSp>
     </p:spTree>
     <p:extLst>
       <p:ext uri="{BB962C8B-B14F-4D97-AF65-F5344CB8AC3E}">

</xml_diff>

<commit_message>
UndoRedoStack: update to store ReadOnlyAddressBook
UndoRedoStack stores the UndoableCommands that were executed for
undoing and redoing of commands.

This forces UndoableCommand to store the previous AddressBook state
required for undoing the command, which is unnecessary coupling.

Let's update UndoRedoStack to store ReadOnlyAddressBook instead, and
update the DeveloperGuide to reflect this change.

Following this change, we are no longer able to do the check of
whether to push into the undo-stack or to clear the redo-stack of the
UndoRedoStack within the UndoRedoStack class as we are no longer pushing
Commands into the UndoRedoStack.

Let's also move the responsibility of checking whether to push into the
undo-stack or to clear the redo-stack to the LogicManager by adding a
helper method LogicManager#updateUndoRedoStack(Command).
</commit_message>
<xml_diff>
--- a/docs/diagrams/UndoRedoActivityDiagram.pptx
+++ b/docs/diagrams/UndoRedoActivityDiagram.pptx
@@ -138,7 +138,7 @@
           <p:cNvPr id="2" name="Title 1">
             <a:extLst>
               <a:ext uri="{FF2B5EF4-FFF2-40B4-BE49-F238E27FC236}">
-                <a16:creationId xmlns:a16="http://schemas.microsoft.com/office/drawing/2014/main" xmlns="" id="{CE1B3102-23FE-4A07-92CF-8DB8025B5C54}"/>
+                <a16:creationId xmlns:a16="http://schemas.microsoft.com/office/drawing/2014/main" id="{CE1B3102-23FE-4A07-92CF-8DB8025B5C54}"/>
               </a:ext>
             </a:extLst>
           </p:cNvPr>
@@ -176,7 +176,7 @@
           <p:cNvPr id="3" name="Subtitle 2">
             <a:extLst>
               <a:ext uri="{FF2B5EF4-FFF2-40B4-BE49-F238E27FC236}">
-                <a16:creationId xmlns:a16="http://schemas.microsoft.com/office/drawing/2014/main" xmlns="" id="{09A64644-374F-4763-B477-E75EED09E18A}"/>
+                <a16:creationId xmlns:a16="http://schemas.microsoft.com/office/drawing/2014/main" id="{09A64644-374F-4763-B477-E75EED09E18A}"/>
               </a:ext>
             </a:extLst>
           </p:cNvPr>
@@ -247,7 +247,7 @@
           <p:cNvPr id="4" name="Date Placeholder 3">
             <a:extLst>
               <a:ext uri="{FF2B5EF4-FFF2-40B4-BE49-F238E27FC236}">
-                <a16:creationId xmlns:a16="http://schemas.microsoft.com/office/drawing/2014/main" xmlns="" id="{26CAD04B-553E-4EE0-8FEC-DA9E05F22F2C}"/>
+                <a16:creationId xmlns:a16="http://schemas.microsoft.com/office/drawing/2014/main" id="{26CAD04B-553E-4EE0-8FEC-DA9E05F22F2C}"/>
               </a:ext>
             </a:extLst>
           </p:cNvPr>
@@ -265,7 +265,7 @@
           <a:p>
             <a:fld id="{542F47FF-5056-41FF-A1F8-23A414798AA4}" type="datetimeFigureOut">
               <a:rPr lang="en-SG" smtClean="0"/>
-              <a:t>30/12/2017</a:t>
+              <a:t>16/4/2018</a:t>
             </a:fld>
             <a:endParaRPr lang="en-SG"/>
           </a:p>
@@ -276,7 +276,7 @@
           <p:cNvPr id="5" name="Footer Placeholder 4">
             <a:extLst>
               <a:ext uri="{FF2B5EF4-FFF2-40B4-BE49-F238E27FC236}">
-                <a16:creationId xmlns:a16="http://schemas.microsoft.com/office/drawing/2014/main" xmlns="" id="{E6F42670-2AD7-448C-BB6C-D759C9255DEB}"/>
+                <a16:creationId xmlns:a16="http://schemas.microsoft.com/office/drawing/2014/main" id="{E6F42670-2AD7-448C-BB6C-D759C9255DEB}"/>
               </a:ext>
             </a:extLst>
           </p:cNvPr>
@@ -301,7 +301,7 @@
           <p:cNvPr id="6" name="Slide Number Placeholder 5">
             <a:extLst>
               <a:ext uri="{FF2B5EF4-FFF2-40B4-BE49-F238E27FC236}">
-                <a16:creationId xmlns:a16="http://schemas.microsoft.com/office/drawing/2014/main" xmlns="" id="{8CFAA546-9089-42A6-8CCB-5E88855E6CB1}"/>
+                <a16:creationId xmlns:a16="http://schemas.microsoft.com/office/drawing/2014/main" id="{8CFAA546-9089-42A6-8CCB-5E88855E6CB1}"/>
               </a:ext>
             </a:extLst>
           </p:cNvPr>
@@ -360,7 +360,7 @@
           <p:cNvPr id="2" name="Title 1">
             <a:extLst>
               <a:ext uri="{FF2B5EF4-FFF2-40B4-BE49-F238E27FC236}">
-                <a16:creationId xmlns:a16="http://schemas.microsoft.com/office/drawing/2014/main" xmlns="" id="{C73C8897-08BA-4903-B8F2-48E6E6713059}"/>
+                <a16:creationId xmlns:a16="http://schemas.microsoft.com/office/drawing/2014/main" id="{C73C8897-08BA-4903-B8F2-48E6E6713059}"/>
               </a:ext>
             </a:extLst>
           </p:cNvPr>
@@ -389,7 +389,7 @@
           <p:cNvPr id="3" name="Vertical Text Placeholder 2">
             <a:extLst>
               <a:ext uri="{FF2B5EF4-FFF2-40B4-BE49-F238E27FC236}">
-                <a16:creationId xmlns:a16="http://schemas.microsoft.com/office/drawing/2014/main" xmlns="" id="{F4DB86F3-F3A8-4AC4-A2D0-18858F9E9EAF}"/>
+                <a16:creationId xmlns:a16="http://schemas.microsoft.com/office/drawing/2014/main" id="{F4DB86F3-F3A8-4AC4-A2D0-18858F9E9EAF}"/>
               </a:ext>
             </a:extLst>
           </p:cNvPr>
@@ -447,7 +447,7 @@
           <p:cNvPr id="4" name="Date Placeholder 3">
             <a:extLst>
               <a:ext uri="{FF2B5EF4-FFF2-40B4-BE49-F238E27FC236}">
-                <a16:creationId xmlns:a16="http://schemas.microsoft.com/office/drawing/2014/main" xmlns="" id="{22C4FC92-3E88-48DC-9327-19CD6A48E96D}"/>
+                <a16:creationId xmlns:a16="http://schemas.microsoft.com/office/drawing/2014/main" id="{22C4FC92-3E88-48DC-9327-19CD6A48E96D}"/>
               </a:ext>
             </a:extLst>
           </p:cNvPr>
@@ -465,7 +465,7 @@
           <a:p>
             <a:fld id="{542F47FF-5056-41FF-A1F8-23A414798AA4}" type="datetimeFigureOut">
               <a:rPr lang="en-SG" smtClean="0"/>
-              <a:t>30/12/2017</a:t>
+              <a:t>16/4/2018</a:t>
             </a:fld>
             <a:endParaRPr lang="en-SG"/>
           </a:p>
@@ -476,7 +476,7 @@
           <p:cNvPr id="5" name="Footer Placeholder 4">
             <a:extLst>
               <a:ext uri="{FF2B5EF4-FFF2-40B4-BE49-F238E27FC236}">
-                <a16:creationId xmlns:a16="http://schemas.microsoft.com/office/drawing/2014/main" xmlns="" id="{AA190F3C-D185-4E17-A1B5-D7F4DF331BE0}"/>
+                <a16:creationId xmlns:a16="http://schemas.microsoft.com/office/drawing/2014/main" id="{AA190F3C-D185-4E17-A1B5-D7F4DF331BE0}"/>
               </a:ext>
             </a:extLst>
           </p:cNvPr>
@@ -501,7 +501,7 @@
           <p:cNvPr id="6" name="Slide Number Placeholder 5">
             <a:extLst>
               <a:ext uri="{FF2B5EF4-FFF2-40B4-BE49-F238E27FC236}">
-                <a16:creationId xmlns:a16="http://schemas.microsoft.com/office/drawing/2014/main" xmlns="" id="{0F2506F5-483C-4F84-8363-1D309E459ADD}"/>
+                <a16:creationId xmlns:a16="http://schemas.microsoft.com/office/drawing/2014/main" id="{0F2506F5-483C-4F84-8363-1D309E459ADD}"/>
               </a:ext>
             </a:extLst>
           </p:cNvPr>
@@ -560,7 +560,7 @@
           <p:cNvPr id="2" name="Vertical Title 1">
             <a:extLst>
               <a:ext uri="{FF2B5EF4-FFF2-40B4-BE49-F238E27FC236}">
-                <a16:creationId xmlns:a16="http://schemas.microsoft.com/office/drawing/2014/main" xmlns="" id="{967C03EB-4647-4E98-B84F-7651E807A990}"/>
+                <a16:creationId xmlns:a16="http://schemas.microsoft.com/office/drawing/2014/main" id="{967C03EB-4647-4E98-B84F-7651E807A990}"/>
               </a:ext>
             </a:extLst>
           </p:cNvPr>
@@ -594,7 +594,7 @@
           <p:cNvPr id="3" name="Vertical Text Placeholder 2">
             <a:extLst>
               <a:ext uri="{FF2B5EF4-FFF2-40B4-BE49-F238E27FC236}">
-                <a16:creationId xmlns:a16="http://schemas.microsoft.com/office/drawing/2014/main" xmlns="" id="{22B1D2A8-918A-4854-959C-EDA5D46D2D74}"/>
+                <a16:creationId xmlns:a16="http://schemas.microsoft.com/office/drawing/2014/main" id="{22B1D2A8-918A-4854-959C-EDA5D46D2D74}"/>
               </a:ext>
             </a:extLst>
           </p:cNvPr>
@@ -657,7 +657,7 @@
           <p:cNvPr id="4" name="Date Placeholder 3">
             <a:extLst>
               <a:ext uri="{FF2B5EF4-FFF2-40B4-BE49-F238E27FC236}">
-                <a16:creationId xmlns:a16="http://schemas.microsoft.com/office/drawing/2014/main" xmlns="" id="{3F77D3B6-616A-4D06-980E-5A7866F9BB49}"/>
+                <a16:creationId xmlns:a16="http://schemas.microsoft.com/office/drawing/2014/main" id="{3F77D3B6-616A-4D06-980E-5A7866F9BB49}"/>
               </a:ext>
             </a:extLst>
           </p:cNvPr>
@@ -675,7 +675,7 @@
           <a:p>
             <a:fld id="{542F47FF-5056-41FF-A1F8-23A414798AA4}" type="datetimeFigureOut">
               <a:rPr lang="en-SG" smtClean="0"/>
-              <a:t>30/12/2017</a:t>
+              <a:t>16/4/2018</a:t>
             </a:fld>
             <a:endParaRPr lang="en-SG"/>
           </a:p>
@@ -686,7 +686,7 @@
           <p:cNvPr id="5" name="Footer Placeholder 4">
             <a:extLst>
               <a:ext uri="{FF2B5EF4-FFF2-40B4-BE49-F238E27FC236}">
-                <a16:creationId xmlns:a16="http://schemas.microsoft.com/office/drawing/2014/main" xmlns="" id="{20525AA2-4FD6-4C5E-B28C-2C71AF011737}"/>
+                <a16:creationId xmlns:a16="http://schemas.microsoft.com/office/drawing/2014/main" id="{20525AA2-4FD6-4C5E-B28C-2C71AF011737}"/>
               </a:ext>
             </a:extLst>
           </p:cNvPr>
@@ -711,7 +711,7 @@
           <p:cNvPr id="6" name="Slide Number Placeholder 5">
             <a:extLst>
               <a:ext uri="{FF2B5EF4-FFF2-40B4-BE49-F238E27FC236}">
-                <a16:creationId xmlns:a16="http://schemas.microsoft.com/office/drawing/2014/main" xmlns="" id="{4E040DF9-BA3F-440A-8819-8D374D74F15E}"/>
+                <a16:creationId xmlns:a16="http://schemas.microsoft.com/office/drawing/2014/main" id="{4E040DF9-BA3F-440A-8819-8D374D74F15E}"/>
               </a:ext>
             </a:extLst>
           </p:cNvPr>
@@ -770,7 +770,7 @@
           <p:cNvPr id="2" name="Title 1">
             <a:extLst>
               <a:ext uri="{FF2B5EF4-FFF2-40B4-BE49-F238E27FC236}">
-                <a16:creationId xmlns:a16="http://schemas.microsoft.com/office/drawing/2014/main" xmlns="" id="{75C804EA-614F-485C-A53F-C32B83B67A30}"/>
+                <a16:creationId xmlns:a16="http://schemas.microsoft.com/office/drawing/2014/main" id="{75C804EA-614F-485C-A53F-C32B83B67A30}"/>
               </a:ext>
             </a:extLst>
           </p:cNvPr>
@@ -799,7 +799,7 @@
           <p:cNvPr id="3" name="Content Placeholder 2">
             <a:extLst>
               <a:ext uri="{FF2B5EF4-FFF2-40B4-BE49-F238E27FC236}">
-                <a16:creationId xmlns:a16="http://schemas.microsoft.com/office/drawing/2014/main" xmlns="" id="{912A86A6-5554-4D2F-97BB-2D649E738506}"/>
+                <a16:creationId xmlns:a16="http://schemas.microsoft.com/office/drawing/2014/main" id="{912A86A6-5554-4D2F-97BB-2D649E738506}"/>
               </a:ext>
             </a:extLst>
           </p:cNvPr>
@@ -857,7 +857,7 @@
           <p:cNvPr id="4" name="Date Placeholder 3">
             <a:extLst>
               <a:ext uri="{FF2B5EF4-FFF2-40B4-BE49-F238E27FC236}">
-                <a16:creationId xmlns:a16="http://schemas.microsoft.com/office/drawing/2014/main" xmlns="" id="{69704FB4-4D28-4A39-B81F-407E0DDD475C}"/>
+                <a16:creationId xmlns:a16="http://schemas.microsoft.com/office/drawing/2014/main" id="{69704FB4-4D28-4A39-B81F-407E0DDD475C}"/>
               </a:ext>
             </a:extLst>
           </p:cNvPr>
@@ -875,7 +875,7 @@
           <a:p>
             <a:fld id="{542F47FF-5056-41FF-A1F8-23A414798AA4}" type="datetimeFigureOut">
               <a:rPr lang="en-SG" smtClean="0"/>
-              <a:t>30/12/2017</a:t>
+              <a:t>16/4/2018</a:t>
             </a:fld>
             <a:endParaRPr lang="en-SG"/>
           </a:p>
@@ -886,7 +886,7 @@
           <p:cNvPr id="5" name="Footer Placeholder 4">
             <a:extLst>
               <a:ext uri="{FF2B5EF4-FFF2-40B4-BE49-F238E27FC236}">
-                <a16:creationId xmlns:a16="http://schemas.microsoft.com/office/drawing/2014/main" xmlns="" id="{AFDB90F4-6173-409D-8731-A4C292C33336}"/>
+                <a16:creationId xmlns:a16="http://schemas.microsoft.com/office/drawing/2014/main" id="{AFDB90F4-6173-409D-8731-A4C292C33336}"/>
               </a:ext>
             </a:extLst>
           </p:cNvPr>
@@ -911,7 +911,7 @@
           <p:cNvPr id="6" name="Slide Number Placeholder 5">
             <a:extLst>
               <a:ext uri="{FF2B5EF4-FFF2-40B4-BE49-F238E27FC236}">
-                <a16:creationId xmlns:a16="http://schemas.microsoft.com/office/drawing/2014/main" xmlns="" id="{0C00E245-E701-4B2E-925D-4322EFA20D66}"/>
+                <a16:creationId xmlns:a16="http://schemas.microsoft.com/office/drawing/2014/main" id="{0C00E245-E701-4B2E-925D-4322EFA20D66}"/>
               </a:ext>
             </a:extLst>
           </p:cNvPr>
@@ -970,7 +970,7 @@
           <p:cNvPr id="2" name="Title 1">
             <a:extLst>
               <a:ext uri="{FF2B5EF4-FFF2-40B4-BE49-F238E27FC236}">
-                <a16:creationId xmlns:a16="http://schemas.microsoft.com/office/drawing/2014/main" xmlns="" id="{2237510E-B988-4DCB-9C02-932F190AC101}"/>
+                <a16:creationId xmlns:a16="http://schemas.microsoft.com/office/drawing/2014/main" id="{2237510E-B988-4DCB-9C02-932F190AC101}"/>
               </a:ext>
             </a:extLst>
           </p:cNvPr>
@@ -1008,7 +1008,7 @@
           <p:cNvPr id="3" name="Text Placeholder 2">
             <a:extLst>
               <a:ext uri="{FF2B5EF4-FFF2-40B4-BE49-F238E27FC236}">
-                <a16:creationId xmlns:a16="http://schemas.microsoft.com/office/drawing/2014/main" xmlns="" id="{784A23DD-6E19-4939-A085-751F973752F5}"/>
+                <a16:creationId xmlns:a16="http://schemas.microsoft.com/office/drawing/2014/main" id="{784A23DD-6E19-4939-A085-751F973752F5}"/>
               </a:ext>
             </a:extLst>
           </p:cNvPr>
@@ -1133,7 +1133,7 @@
           <p:cNvPr id="4" name="Date Placeholder 3">
             <a:extLst>
               <a:ext uri="{FF2B5EF4-FFF2-40B4-BE49-F238E27FC236}">
-                <a16:creationId xmlns:a16="http://schemas.microsoft.com/office/drawing/2014/main" xmlns="" id="{CD5B15F4-A7B8-4D17-8C46-94AC6465D19A}"/>
+                <a16:creationId xmlns:a16="http://schemas.microsoft.com/office/drawing/2014/main" id="{CD5B15F4-A7B8-4D17-8C46-94AC6465D19A}"/>
               </a:ext>
             </a:extLst>
           </p:cNvPr>
@@ -1151,7 +1151,7 @@
           <a:p>
             <a:fld id="{542F47FF-5056-41FF-A1F8-23A414798AA4}" type="datetimeFigureOut">
               <a:rPr lang="en-SG" smtClean="0"/>
-              <a:t>30/12/2017</a:t>
+              <a:t>16/4/2018</a:t>
             </a:fld>
             <a:endParaRPr lang="en-SG"/>
           </a:p>
@@ -1162,7 +1162,7 @@
           <p:cNvPr id="5" name="Footer Placeholder 4">
             <a:extLst>
               <a:ext uri="{FF2B5EF4-FFF2-40B4-BE49-F238E27FC236}">
-                <a16:creationId xmlns:a16="http://schemas.microsoft.com/office/drawing/2014/main" xmlns="" id="{0CC0B098-2820-40C0-8166-283BB17CD72D}"/>
+                <a16:creationId xmlns:a16="http://schemas.microsoft.com/office/drawing/2014/main" id="{0CC0B098-2820-40C0-8166-283BB17CD72D}"/>
               </a:ext>
             </a:extLst>
           </p:cNvPr>
@@ -1187,7 +1187,7 @@
           <p:cNvPr id="6" name="Slide Number Placeholder 5">
             <a:extLst>
               <a:ext uri="{FF2B5EF4-FFF2-40B4-BE49-F238E27FC236}">
-                <a16:creationId xmlns:a16="http://schemas.microsoft.com/office/drawing/2014/main" xmlns="" id="{CA1D6085-5297-4CE0-858B-F5A8477F21A1}"/>
+                <a16:creationId xmlns:a16="http://schemas.microsoft.com/office/drawing/2014/main" id="{CA1D6085-5297-4CE0-858B-F5A8477F21A1}"/>
               </a:ext>
             </a:extLst>
           </p:cNvPr>
@@ -1246,7 +1246,7 @@
           <p:cNvPr id="2" name="Title 1">
             <a:extLst>
               <a:ext uri="{FF2B5EF4-FFF2-40B4-BE49-F238E27FC236}">
-                <a16:creationId xmlns:a16="http://schemas.microsoft.com/office/drawing/2014/main" xmlns="" id="{C8312645-9305-4015-B5DF-8CD06CE54CD2}"/>
+                <a16:creationId xmlns:a16="http://schemas.microsoft.com/office/drawing/2014/main" id="{C8312645-9305-4015-B5DF-8CD06CE54CD2}"/>
               </a:ext>
             </a:extLst>
           </p:cNvPr>
@@ -1275,7 +1275,7 @@
           <p:cNvPr id="3" name="Content Placeholder 2">
             <a:extLst>
               <a:ext uri="{FF2B5EF4-FFF2-40B4-BE49-F238E27FC236}">
-                <a16:creationId xmlns:a16="http://schemas.microsoft.com/office/drawing/2014/main" xmlns="" id="{5F718F3D-23A6-4BAE-A195-9290BED99436}"/>
+                <a16:creationId xmlns:a16="http://schemas.microsoft.com/office/drawing/2014/main" id="{5F718F3D-23A6-4BAE-A195-9290BED99436}"/>
               </a:ext>
             </a:extLst>
           </p:cNvPr>
@@ -1338,7 +1338,7 @@
           <p:cNvPr id="4" name="Content Placeholder 3">
             <a:extLst>
               <a:ext uri="{FF2B5EF4-FFF2-40B4-BE49-F238E27FC236}">
-                <a16:creationId xmlns:a16="http://schemas.microsoft.com/office/drawing/2014/main" xmlns="" id="{987DE0C4-EF3A-42E6-9D3E-22C7A0BC9A37}"/>
+                <a16:creationId xmlns:a16="http://schemas.microsoft.com/office/drawing/2014/main" id="{987DE0C4-EF3A-42E6-9D3E-22C7A0BC9A37}"/>
               </a:ext>
             </a:extLst>
           </p:cNvPr>
@@ -1401,7 +1401,7 @@
           <p:cNvPr id="5" name="Date Placeholder 4">
             <a:extLst>
               <a:ext uri="{FF2B5EF4-FFF2-40B4-BE49-F238E27FC236}">
-                <a16:creationId xmlns:a16="http://schemas.microsoft.com/office/drawing/2014/main" xmlns="" id="{E4BFA167-4D74-44D4-AA06-F7DBEA7BB015}"/>
+                <a16:creationId xmlns:a16="http://schemas.microsoft.com/office/drawing/2014/main" id="{E4BFA167-4D74-44D4-AA06-F7DBEA7BB015}"/>
               </a:ext>
             </a:extLst>
           </p:cNvPr>
@@ -1419,7 +1419,7 @@
           <a:p>
             <a:fld id="{542F47FF-5056-41FF-A1F8-23A414798AA4}" type="datetimeFigureOut">
               <a:rPr lang="en-SG" smtClean="0"/>
-              <a:t>30/12/2017</a:t>
+              <a:t>16/4/2018</a:t>
             </a:fld>
             <a:endParaRPr lang="en-SG"/>
           </a:p>
@@ -1430,7 +1430,7 @@
           <p:cNvPr id="6" name="Footer Placeholder 5">
             <a:extLst>
               <a:ext uri="{FF2B5EF4-FFF2-40B4-BE49-F238E27FC236}">
-                <a16:creationId xmlns:a16="http://schemas.microsoft.com/office/drawing/2014/main" xmlns="" id="{000F966C-5803-470B-AFA7-C187FB7AE76F}"/>
+                <a16:creationId xmlns:a16="http://schemas.microsoft.com/office/drawing/2014/main" id="{000F966C-5803-470B-AFA7-C187FB7AE76F}"/>
               </a:ext>
             </a:extLst>
           </p:cNvPr>
@@ -1455,7 +1455,7 @@
           <p:cNvPr id="7" name="Slide Number Placeholder 6">
             <a:extLst>
               <a:ext uri="{FF2B5EF4-FFF2-40B4-BE49-F238E27FC236}">
-                <a16:creationId xmlns:a16="http://schemas.microsoft.com/office/drawing/2014/main" xmlns="" id="{C5072683-17F0-489D-BA30-0EAE1A9786AE}"/>
+                <a16:creationId xmlns:a16="http://schemas.microsoft.com/office/drawing/2014/main" id="{C5072683-17F0-489D-BA30-0EAE1A9786AE}"/>
               </a:ext>
             </a:extLst>
           </p:cNvPr>
@@ -1514,7 +1514,7 @@
           <p:cNvPr id="2" name="Title 1">
             <a:extLst>
               <a:ext uri="{FF2B5EF4-FFF2-40B4-BE49-F238E27FC236}">
-                <a16:creationId xmlns:a16="http://schemas.microsoft.com/office/drawing/2014/main" xmlns="" id="{CEC7B897-F9D1-4F32-BB47-48174A5ED64C}"/>
+                <a16:creationId xmlns:a16="http://schemas.microsoft.com/office/drawing/2014/main" id="{CEC7B897-F9D1-4F32-BB47-48174A5ED64C}"/>
               </a:ext>
             </a:extLst>
           </p:cNvPr>
@@ -1548,7 +1548,7 @@
           <p:cNvPr id="3" name="Text Placeholder 2">
             <a:extLst>
               <a:ext uri="{FF2B5EF4-FFF2-40B4-BE49-F238E27FC236}">
-                <a16:creationId xmlns:a16="http://schemas.microsoft.com/office/drawing/2014/main" xmlns="" id="{F641612B-9729-43C6-B566-AD5088E65020}"/>
+                <a16:creationId xmlns:a16="http://schemas.microsoft.com/office/drawing/2014/main" id="{F641612B-9729-43C6-B566-AD5088E65020}"/>
               </a:ext>
             </a:extLst>
           </p:cNvPr>
@@ -1619,7 +1619,7 @@
           <p:cNvPr id="4" name="Content Placeholder 3">
             <a:extLst>
               <a:ext uri="{FF2B5EF4-FFF2-40B4-BE49-F238E27FC236}">
-                <a16:creationId xmlns:a16="http://schemas.microsoft.com/office/drawing/2014/main" xmlns="" id="{C9E1DDFB-755B-486A-8E6E-CC7CFE66970C}"/>
+                <a16:creationId xmlns:a16="http://schemas.microsoft.com/office/drawing/2014/main" id="{C9E1DDFB-755B-486A-8E6E-CC7CFE66970C}"/>
               </a:ext>
             </a:extLst>
           </p:cNvPr>
@@ -1682,7 +1682,7 @@
           <p:cNvPr id="5" name="Text Placeholder 4">
             <a:extLst>
               <a:ext uri="{FF2B5EF4-FFF2-40B4-BE49-F238E27FC236}">
-                <a16:creationId xmlns:a16="http://schemas.microsoft.com/office/drawing/2014/main" xmlns="" id="{9C513BAE-7453-4E00-A4D1-7192F85ACD26}"/>
+                <a16:creationId xmlns:a16="http://schemas.microsoft.com/office/drawing/2014/main" id="{9C513BAE-7453-4E00-A4D1-7192F85ACD26}"/>
               </a:ext>
             </a:extLst>
           </p:cNvPr>
@@ -1753,7 +1753,7 @@
           <p:cNvPr id="6" name="Content Placeholder 5">
             <a:extLst>
               <a:ext uri="{FF2B5EF4-FFF2-40B4-BE49-F238E27FC236}">
-                <a16:creationId xmlns:a16="http://schemas.microsoft.com/office/drawing/2014/main" xmlns="" id="{CD44104D-C0AE-4458-869E-DFF710C415CC}"/>
+                <a16:creationId xmlns:a16="http://schemas.microsoft.com/office/drawing/2014/main" id="{CD44104D-C0AE-4458-869E-DFF710C415CC}"/>
               </a:ext>
             </a:extLst>
           </p:cNvPr>
@@ -1816,7 +1816,7 @@
           <p:cNvPr id="7" name="Date Placeholder 6">
             <a:extLst>
               <a:ext uri="{FF2B5EF4-FFF2-40B4-BE49-F238E27FC236}">
-                <a16:creationId xmlns:a16="http://schemas.microsoft.com/office/drawing/2014/main" xmlns="" id="{4CB7CAF3-D690-40A3-88F7-9D0D17864C18}"/>
+                <a16:creationId xmlns:a16="http://schemas.microsoft.com/office/drawing/2014/main" id="{4CB7CAF3-D690-40A3-88F7-9D0D17864C18}"/>
               </a:ext>
             </a:extLst>
           </p:cNvPr>
@@ -1834,7 +1834,7 @@
           <a:p>
             <a:fld id="{542F47FF-5056-41FF-A1F8-23A414798AA4}" type="datetimeFigureOut">
               <a:rPr lang="en-SG" smtClean="0"/>
-              <a:t>30/12/2017</a:t>
+              <a:t>16/4/2018</a:t>
             </a:fld>
             <a:endParaRPr lang="en-SG"/>
           </a:p>
@@ -1845,7 +1845,7 @@
           <p:cNvPr id="8" name="Footer Placeholder 7">
             <a:extLst>
               <a:ext uri="{FF2B5EF4-FFF2-40B4-BE49-F238E27FC236}">
-                <a16:creationId xmlns:a16="http://schemas.microsoft.com/office/drawing/2014/main" xmlns="" id="{E3FCCAB0-63DD-4704-AA42-E4F81E641DA3}"/>
+                <a16:creationId xmlns:a16="http://schemas.microsoft.com/office/drawing/2014/main" id="{E3FCCAB0-63DD-4704-AA42-E4F81E641DA3}"/>
               </a:ext>
             </a:extLst>
           </p:cNvPr>
@@ -1870,7 +1870,7 @@
           <p:cNvPr id="9" name="Slide Number Placeholder 8">
             <a:extLst>
               <a:ext uri="{FF2B5EF4-FFF2-40B4-BE49-F238E27FC236}">
-                <a16:creationId xmlns:a16="http://schemas.microsoft.com/office/drawing/2014/main" xmlns="" id="{604EFCC3-8687-4BC3-9C9E-60FD561B237F}"/>
+                <a16:creationId xmlns:a16="http://schemas.microsoft.com/office/drawing/2014/main" id="{604EFCC3-8687-4BC3-9C9E-60FD561B237F}"/>
               </a:ext>
             </a:extLst>
           </p:cNvPr>
@@ -1929,7 +1929,7 @@
           <p:cNvPr id="2" name="Title 1">
             <a:extLst>
               <a:ext uri="{FF2B5EF4-FFF2-40B4-BE49-F238E27FC236}">
-                <a16:creationId xmlns:a16="http://schemas.microsoft.com/office/drawing/2014/main" xmlns="" id="{D324AE97-E2C9-4642-887A-4474C5566AA6}"/>
+                <a16:creationId xmlns:a16="http://schemas.microsoft.com/office/drawing/2014/main" id="{D324AE97-E2C9-4642-887A-4474C5566AA6}"/>
               </a:ext>
             </a:extLst>
           </p:cNvPr>
@@ -1958,7 +1958,7 @@
           <p:cNvPr id="3" name="Date Placeholder 2">
             <a:extLst>
               <a:ext uri="{FF2B5EF4-FFF2-40B4-BE49-F238E27FC236}">
-                <a16:creationId xmlns:a16="http://schemas.microsoft.com/office/drawing/2014/main" xmlns="" id="{919EDCEA-D8A9-431E-AF93-4824C03FD0F2}"/>
+                <a16:creationId xmlns:a16="http://schemas.microsoft.com/office/drawing/2014/main" id="{919EDCEA-D8A9-431E-AF93-4824C03FD0F2}"/>
               </a:ext>
             </a:extLst>
           </p:cNvPr>
@@ -1976,7 +1976,7 @@
           <a:p>
             <a:fld id="{542F47FF-5056-41FF-A1F8-23A414798AA4}" type="datetimeFigureOut">
               <a:rPr lang="en-SG" smtClean="0"/>
-              <a:t>30/12/2017</a:t>
+              <a:t>16/4/2018</a:t>
             </a:fld>
             <a:endParaRPr lang="en-SG"/>
           </a:p>
@@ -1987,7 +1987,7 @@
           <p:cNvPr id="4" name="Footer Placeholder 3">
             <a:extLst>
               <a:ext uri="{FF2B5EF4-FFF2-40B4-BE49-F238E27FC236}">
-                <a16:creationId xmlns:a16="http://schemas.microsoft.com/office/drawing/2014/main" xmlns="" id="{1F13DD51-16D3-435A-A475-0C2A7255A05E}"/>
+                <a16:creationId xmlns:a16="http://schemas.microsoft.com/office/drawing/2014/main" id="{1F13DD51-16D3-435A-A475-0C2A7255A05E}"/>
               </a:ext>
             </a:extLst>
           </p:cNvPr>
@@ -2012,7 +2012,7 @@
           <p:cNvPr id="5" name="Slide Number Placeholder 4">
             <a:extLst>
               <a:ext uri="{FF2B5EF4-FFF2-40B4-BE49-F238E27FC236}">
-                <a16:creationId xmlns:a16="http://schemas.microsoft.com/office/drawing/2014/main" xmlns="" id="{3D7AC15F-BADE-4466-835A-57B1A9E5162B}"/>
+                <a16:creationId xmlns:a16="http://schemas.microsoft.com/office/drawing/2014/main" id="{3D7AC15F-BADE-4466-835A-57B1A9E5162B}"/>
               </a:ext>
             </a:extLst>
           </p:cNvPr>
@@ -2071,7 +2071,7 @@
           <p:cNvPr id="2" name="Date Placeholder 1">
             <a:extLst>
               <a:ext uri="{FF2B5EF4-FFF2-40B4-BE49-F238E27FC236}">
-                <a16:creationId xmlns:a16="http://schemas.microsoft.com/office/drawing/2014/main" xmlns="" id="{48F01CC8-EEC4-4B3C-8C73-3EBB7DCEBE67}"/>
+                <a16:creationId xmlns:a16="http://schemas.microsoft.com/office/drawing/2014/main" id="{48F01CC8-EEC4-4B3C-8C73-3EBB7DCEBE67}"/>
               </a:ext>
             </a:extLst>
           </p:cNvPr>
@@ -2089,7 +2089,7 @@
           <a:p>
             <a:fld id="{542F47FF-5056-41FF-A1F8-23A414798AA4}" type="datetimeFigureOut">
               <a:rPr lang="en-SG" smtClean="0"/>
-              <a:t>30/12/2017</a:t>
+              <a:t>16/4/2018</a:t>
             </a:fld>
             <a:endParaRPr lang="en-SG"/>
           </a:p>
@@ -2100,7 +2100,7 @@
           <p:cNvPr id="3" name="Footer Placeholder 2">
             <a:extLst>
               <a:ext uri="{FF2B5EF4-FFF2-40B4-BE49-F238E27FC236}">
-                <a16:creationId xmlns:a16="http://schemas.microsoft.com/office/drawing/2014/main" xmlns="" id="{4D820BAF-6E28-43DA-9E9B-8C229AB2A964}"/>
+                <a16:creationId xmlns:a16="http://schemas.microsoft.com/office/drawing/2014/main" id="{4D820BAF-6E28-43DA-9E9B-8C229AB2A964}"/>
               </a:ext>
             </a:extLst>
           </p:cNvPr>
@@ -2125,7 +2125,7 @@
           <p:cNvPr id="4" name="Slide Number Placeholder 3">
             <a:extLst>
               <a:ext uri="{FF2B5EF4-FFF2-40B4-BE49-F238E27FC236}">
-                <a16:creationId xmlns:a16="http://schemas.microsoft.com/office/drawing/2014/main" xmlns="" id="{49BFE3EF-B472-4F66-80D5-1B722E8086E6}"/>
+                <a16:creationId xmlns:a16="http://schemas.microsoft.com/office/drawing/2014/main" id="{49BFE3EF-B472-4F66-80D5-1B722E8086E6}"/>
               </a:ext>
             </a:extLst>
           </p:cNvPr>
@@ -2184,7 +2184,7 @@
           <p:cNvPr id="2" name="Title 1">
             <a:extLst>
               <a:ext uri="{FF2B5EF4-FFF2-40B4-BE49-F238E27FC236}">
-                <a16:creationId xmlns:a16="http://schemas.microsoft.com/office/drawing/2014/main" xmlns="" id="{E1ABDE73-0F58-47D3-8C8B-C147DE1C0B22}"/>
+                <a16:creationId xmlns:a16="http://schemas.microsoft.com/office/drawing/2014/main" id="{E1ABDE73-0F58-47D3-8C8B-C147DE1C0B22}"/>
               </a:ext>
             </a:extLst>
           </p:cNvPr>
@@ -2222,7 +2222,7 @@
           <p:cNvPr id="3" name="Content Placeholder 2">
             <a:extLst>
               <a:ext uri="{FF2B5EF4-FFF2-40B4-BE49-F238E27FC236}">
-                <a16:creationId xmlns:a16="http://schemas.microsoft.com/office/drawing/2014/main" xmlns="" id="{0167F6A8-B979-42A6-B421-40577DD5582F}"/>
+                <a16:creationId xmlns:a16="http://schemas.microsoft.com/office/drawing/2014/main" id="{0167F6A8-B979-42A6-B421-40577DD5582F}"/>
               </a:ext>
             </a:extLst>
           </p:cNvPr>
@@ -2313,7 +2313,7 @@
           <p:cNvPr id="4" name="Text Placeholder 3">
             <a:extLst>
               <a:ext uri="{FF2B5EF4-FFF2-40B4-BE49-F238E27FC236}">
-                <a16:creationId xmlns:a16="http://schemas.microsoft.com/office/drawing/2014/main" xmlns="" id="{6887A488-06FE-46E9-8AC5-DF38A61CCF05}"/>
+                <a16:creationId xmlns:a16="http://schemas.microsoft.com/office/drawing/2014/main" id="{6887A488-06FE-46E9-8AC5-DF38A61CCF05}"/>
               </a:ext>
             </a:extLst>
           </p:cNvPr>
@@ -2384,7 +2384,7 @@
           <p:cNvPr id="5" name="Date Placeholder 4">
             <a:extLst>
               <a:ext uri="{FF2B5EF4-FFF2-40B4-BE49-F238E27FC236}">
-                <a16:creationId xmlns:a16="http://schemas.microsoft.com/office/drawing/2014/main" xmlns="" id="{1225C56B-78B2-45C0-A8A9-C9D435A286D0}"/>
+                <a16:creationId xmlns:a16="http://schemas.microsoft.com/office/drawing/2014/main" id="{1225C56B-78B2-45C0-A8A9-C9D435A286D0}"/>
               </a:ext>
             </a:extLst>
           </p:cNvPr>
@@ -2402,7 +2402,7 @@
           <a:p>
             <a:fld id="{542F47FF-5056-41FF-A1F8-23A414798AA4}" type="datetimeFigureOut">
               <a:rPr lang="en-SG" smtClean="0"/>
-              <a:t>30/12/2017</a:t>
+              <a:t>16/4/2018</a:t>
             </a:fld>
             <a:endParaRPr lang="en-SG"/>
           </a:p>
@@ -2413,7 +2413,7 @@
           <p:cNvPr id="6" name="Footer Placeholder 5">
             <a:extLst>
               <a:ext uri="{FF2B5EF4-FFF2-40B4-BE49-F238E27FC236}">
-                <a16:creationId xmlns:a16="http://schemas.microsoft.com/office/drawing/2014/main" xmlns="" id="{3F9E1B9E-B673-4E26-9323-D731DC395F9C}"/>
+                <a16:creationId xmlns:a16="http://schemas.microsoft.com/office/drawing/2014/main" id="{3F9E1B9E-B673-4E26-9323-D731DC395F9C}"/>
               </a:ext>
             </a:extLst>
           </p:cNvPr>
@@ -2438,7 +2438,7 @@
           <p:cNvPr id="7" name="Slide Number Placeholder 6">
             <a:extLst>
               <a:ext uri="{FF2B5EF4-FFF2-40B4-BE49-F238E27FC236}">
-                <a16:creationId xmlns:a16="http://schemas.microsoft.com/office/drawing/2014/main" xmlns="" id="{6633AB4A-8EB3-4154-869B-5580DEDF4F79}"/>
+                <a16:creationId xmlns:a16="http://schemas.microsoft.com/office/drawing/2014/main" id="{6633AB4A-8EB3-4154-869B-5580DEDF4F79}"/>
               </a:ext>
             </a:extLst>
           </p:cNvPr>
@@ -2497,7 +2497,7 @@
           <p:cNvPr id="2" name="Title 1">
             <a:extLst>
               <a:ext uri="{FF2B5EF4-FFF2-40B4-BE49-F238E27FC236}">
-                <a16:creationId xmlns:a16="http://schemas.microsoft.com/office/drawing/2014/main" xmlns="" id="{61D5430E-44A7-4B67-9F34-F532D5533356}"/>
+                <a16:creationId xmlns:a16="http://schemas.microsoft.com/office/drawing/2014/main" id="{61D5430E-44A7-4B67-9F34-F532D5533356}"/>
               </a:ext>
             </a:extLst>
           </p:cNvPr>
@@ -2535,7 +2535,7 @@
           <p:cNvPr id="3" name="Picture Placeholder 2">
             <a:extLst>
               <a:ext uri="{FF2B5EF4-FFF2-40B4-BE49-F238E27FC236}">
-                <a16:creationId xmlns:a16="http://schemas.microsoft.com/office/drawing/2014/main" xmlns="" id="{94374BCC-AC4A-4ED0-A7BD-6B2491EAED7E}"/>
+                <a16:creationId xmlns:a16="http://schemas.microsoft.com/office/drawing/2014/main" id="{94374BCC-AC4A-4ED0-A7BD-6B2491EAED7E}"/>
               </a:ext>
             </a:extLst>
           </p:cNvPr>
@@ -2602,7 +2602,7 @@
           <p:cNvPr id="4" name="Text Placeholder 3">
             <a:extLst>
               <a:ext uri="{FF2B5EF4-FFF2-40B4-BE49-F238E27FC236}">
-                <a16:creationId xmlns:a16="http://schemas.microsoft.com/office/drawing/2014/main" xmlns="" id="{5AD4568E-164B-462E-9285-49B735DD9DE7}"/>
+                <a16:creationId xmlns:a16="http://schemas.microsoft.com/office/drawing/2014/main" id="{5AD4568E-164B-462E-9285-49B735DD9DE7}"/>
               </a:ext>
             </a:extLst>
           </p:cNvPr>
@@ -2673,7 +2673,7 @@
           <p:cNvPr id="5" name="Date Placeholder 4">
             <a:extLst>
               <a:ext uri="{FF2B5EF4-FFF2-40B4-BE49-F238E27FC236}">
-                <a16:creationId xmlns:a16="http://schemas.microsoft.com/office/drawing/2014/main" xmlns="" id="{ABD88AB5-C9D0-4013-85B4-2228545F24AD}"/>
+                <a16:creationId xmlns:a16="http://schemas.microsoft.com/office/drawing/2014/main" id="{ABD88AB5-C9D0-4013-85B4-2228545F24AD}"/>
               </a:ext>
             </a:extLst>
           </p:cNvPr>
@@ -2691,7 +2691,7 @@
           <a:p>
             <a:fld id="{542F47FF-5056-41FF-A1F8-23A414798AA4}" type="datetimeFigureOut">
               <a:rPr lang="en-SG" smtClean="0"/>
-              <a:t>30/12/2017</a:t>
+              <a:t>16/4/2018</a:t>
             </a:fld>
             <a:endParaRPr lang="en-SG"/>
           </a:p>
@@ -2702,7 +2702,7 @@
           <p:cNvPr id="6" name="Footer Placeholder 5">
             <a:extLst>
               <a:ext uri="{FF2B5EF4-FFF2-40B4-BE49-F238E27FC236}">
-                <a16:creationId xmlns:a16="http://schemas.microsoft.com/office/drawing/2014/main" xmlns="" id="{6378A798-E2A6-4417-A003-DE553E8EC325}"/>
+                <a16:creationId xmlns:a16="http://schemas.microsoft.com/office/drawing/2014/main" id="{6378A798-E2A6-4417-A003-DE553E8EC325}"/>
               </a:ext>
             </a:extLst>
           </p:cNvPr>
@@ -2727,7 +2727,7 @@
           <p:cNvPr id="7" name="Slide Number Placeholder 6">
             <a:extLst>
               <a:ext uri="{FF2B5EF4-FFF2-40B4-BE49-F238E27FC236}">
-                <a16:creationId xmlns:a16="http://schemas.microsoft.com/office/drawing/2014/main" xmlns="" id="{7BC6852D-C345-455C-9499-B57AE4D2D943}"/>
+                <a16:creationId xmlns:a16="http://schemas.microsoft.com/office/drawing/2014/main" id="{7BC6852D-C345-455C-9499-B57AE4D2D943}"/>
               </a:ext>
             </a:extLst>
           </p:cNvPr>
@@ -2791,7 +2791,7 @@
           <p:cNvPr id="2" name="Title Placeholder 1">
             <a:extLst>
               <a:ext uri="{FF2B5EF4-FFF2-40B4-BE49-F238E27FC236}">
-                <a16:creationId xmlns:a16="http://schemas.microsoft.com/office/drawing/2014/main" xmlns="" id="{CF097353-E272-4974-B34C-369C28928CA1}"/>
+                <a16:creationId xmlns:a16="http://schemas.microsoft.com/office/drawing/2014/main" id="{CF097353-E272-4974-B34C-369C28928CA1}"/>
               </a:ext>
             </a:extLst>
           </p:cNvPr>
@@ -2830,7 +2830,7 @@
           <p:cNvPr id="3" name="Text Placeholder 2">
             <a:extLst>
               <a:ext uri="{FF2B5EF4-FFF2-40B4-BE49-F238E27FC236}">
-                <a16:creationId xmlns:a16="http://schemas.microsoft.com/office/drawing/2014/main" xmlns="" id="{BB1BE290-84C1-4415-A557-1ACC36D1226C}"/>
+                <a16:creationId xmlns:a16="http://schemas.microsoft.com/office/drawing/2014/main" id="{BB1BE290-84C1-4415-A557-1ACC36D1226C}"/>
               </a:ext>
             </a:extLst>
           </p:cNvPr>
@@ -2898,7 +2898,7 @@
           <p:cNvPr id="4" name="Date Placeholder 3">
             <a:extLst>
               <a:ext uri="{FF2B5EF4-FFF2-40B4-BE49-F238E27FC236}">
-                <a16:creationId xmlns:a16="http://schemas.microsoft.com/office/drawing/2014/main" xmlns="" id="{F7EAAB47-96EA-44D5-8293-0D696F52A395}"/>
+                <a16:creationId xmlns:a16="http://schemas.microsoft.com/office/drawing/2014/main" id="{F7EAAB47-96EA-44D5-8293-0D696F52A395}"/>
               </a:ext>
             </a:extLst>
           </p:cNvPr>
@@ -2934,7 +2934,7 @@
           <a:p>
             <a:fld id="{542F47FF-5056-41FF-A1F8-23A414798AA4}" type="datetimeFigureOut">
               <a:rPr lang="en-SG" smtClean="0"/>
-              <a:t>30/12/2017</a:t>
+              <a:t>16/4/2018</a:t>
             </a:fld>
             <a:endParaRPr lang="en-SG"/>
           </a:p>
@@ -2945,7 +2945,7 @@
           <p:cNvPr id="5" name="Footer Placeholder 4">
             <a:extLst>
               <a:ext uri="{FF2B5EF4-FFF2-40B4-BE49-F238E27FC236}">
-                <a16:creationId xmlns:a16="http://schemas.microsoft.com/office/drawing/2014/main" xmlns="" id="{F21C6E84-C98D-4391-98A0-E77A4221131C}"/>
+                <a16:creationId xmlns:a16="http://schemas.microsoft.com/office/drawing/2014/main" id="{F21C6E84-C98D-4391-98A0-E77A4221131C}"/>
               </a:ext>
             </a:extLst>
           </p:cNvPr>
@@ -2988,7 +2988,7 @@
           <p:cNvPr id="6" name="Slide Number Placeholder 5">
             <a:extLst>
               <a:ext uri="{FF2B5EF4-FFF2-40B4-BE49-F238E27FC236}">
-                <a16:creationId xmlns:a16="http://schemas.microsoft.com/office/drawing/2014/main" xmlns="" id="{FB352E9C-7394-48E0-A08D-56390F6520E1}"/>
+                <a16:creationId xmlns:a16="http://schemas.microsoft.com/office/drawing/2014/main" id="{FB352E9C-7394-48E0-A08D-56390F6520E1}"/>
               </a:ext>
             </a:extLst>
           </p:cNvPr>
@@ -3356,7 +3356,7 @@
           <p:cNvPr id="4" name="Oval 3">
             <a:extLst>
               <a:ext uri="{FF2B5EF4-FFF2-40B4-BE49-F238E27FC236}">
-                <a16:creationId xmlns:a16="http://schemas.microsoft.com/office/drawing/2014/main" xmlns="" id="{D45F487B-A914-4C8E-B564-00C9D621567D}"/>
+                <a16:creationId xmlns:a16="http://schemas.microsoft.com/office/drawing/2014/main" id="{D45F487B-A914-4C8E-B564-00C9D621567D}"/>
               </a:ext>
             </a:extLst>
           </p:cNvPr>
@@ -3405,7 +3405,7 @@
           <p:cNvPr id="6" name="Straight Arrow Connector 5">
             <a:extLst>
               <a:ext uri="{FF2B5EF4-FFF2-40B4-BE49-F238E27FC236}">
-                <a16:creationId xmlns:a16="http://schemas.microsoft.com/office/drawing/2014/main" xmlns="" id="{73D6638D-34B0-4D9A-B7DC-62ABF1C7D407}"/>
+                <a16:creationId xmlns:a16="http://schemas.microsoft.com/office/drawing/2014/main" id="{73D6638D-34B0-4D9A-B7DC-62ABF1C7D407}"/>
               </a:ext>
             </a:extLst>
           </p:cNvPr>
@@ -3448,7 +3448,7 @@
           <p:cNvPr id="8" name="Rectangle: Rounded Corners 7">
             <a:extLst>
               <a:ext uri="{FF2B5EF4-FFF2-40B4-BE49-F238E27FC236}">
-                <a16:creationId xmlns:a16="http://schemas.microsoft.com/office/drawing/2014/main" xmlns="" id="{C13E6F3C-30CD-49FB-94D8-AF011F54E935}"/>
+                <a16:creationId xmlns:a16="http://schemas.microsoft.com/office/drawing/2014/main" id="{C13E6F3C-30CD-49FB-94D8-AF011F54E935}"/>
               </a:ext>
             </a:extLst>
           </p:cNvPr>
@@ -3500,7 +3500,7 @@
           <p:cNvPr id="9" name="Straight Arrow Connector 8">
             <a:extLst>
               <a:ext uri="{FF2B5EF4-FFF2-40B4-BE49-F238E27FC236}">
-                <a16:creationId xmlns:a16="http://schemas.microsoft.com/office/drawing/2014/main" xmlns="" id="{6A0B3198-7B18-417D-A041-B13DF5BAE7A6}"/>
+                <a16:creationId xmlns:a16="http://schemas.microsoft.com/office/drawing/2014/main" id="{6A0B3198-7B18-417D-A041-B13DF5BAE7A6}"/>
               </a:ext>
             </a:extLst>
           </p:cNvPr>
@@ -3542,7 +3542,7 @@
           <p:cNvPr id="12" name="Diamond 11">
             <a:extLst>
               <a:ext uri="{FF2B5EF4-FFF2-40B4-BE49-F238E27FC236}">
-                <a16:creationId xmlns:a16="http://schemas.microsoft.com/office/drawing/2014/main" xmlns="" id="{8E8723C3-03E7-46BE-8211-AAF9ADC7B033}"/>
+                <a16:creationId xmlns:a16="http://schemas.microsoft.com/office/drawing/2014/main" id="{8E8723C3-03E7-46BE-8211-AAF9ADC7B033}"/>
               </a:ext>
             </a:extLst>
           </p:cNvPr>
@@ -3591,7 +3591,7 @@
           <p:cNvPr id="19" name="TextBox 18">
             <a:extLst>
               <a:ext uri="{FF2B5EF4-FFF2-40B4-BE49-F238E27FC236}">
-                <a16:creationId xmlns:a16="http://schemas.microsoft.com/office/drawing/2014/main" xmlns="" id="{3ABD3846-DF71-49C4-AE22-6CE1C8B39149}"/>
+                <a16:creationId xmlns:a16="http://schemas.microsoft.com/office/drawing/2014/main" id="{3ABD3846-DF71-49C4-AE22-6CE1C8B39149}"/>
               </a:ext>
             </a:extLst>
           </p:cNvPr>
@@ -3646,7 +3646,7 @@
           <p:cNvPr id="20" name="TextBox 19">
             <a:extLst>
               <a:ext uri="{FF2B5EF4-FFF2-40B4-BE49-F238E27FC236}">
-                <a16:creationId xmlns:a16="http://schemas.microsoft.com/office/drawing/2014/main" xmlns="" id="{950BB788-4B9F-4654-A5F0-F380DA681824}"/>
+                <a16:creationId xmlns:a16="http://schemas.microsoft.com/office/drawing/2014/main" id="{950BB788-4B9F-4654-A5F0-F380DA681824}"/>
               </a:ext>
             </a:extLst>
           </p:cNvPr>
@@ -3681,7 +3681,7 @@
           <p:cNvPr id="22" name="Rectangle: Rounded Corners 21">
             <a:extLst>
               <a:ext uri="{FF2B5EF4-FFF2-40B4-BE49-F238E27FC236}">
-                <a16:creationId xmlns:a16="http://schemas.microsoft.com/office/drawing/2014/main" xmlns="" id="{A323A4FC-FF89-4B75-A4E8-6FA28B7DCA83}"/>
+                <a16:creationId xmlns:a16="http://schemas.microsoft.com/office/drawing/2014/main" id="{A323A4FC-FF89-4B75-A4E8-6FA28B7DCA83}"/>
               </a:ext>
             </a:extLst>
           </p:cNvPr>
@@ -3733,7 +3733,7 @@
           <p:cNvPr id="26" name="Diamond 25">
             <a:extLst>
               <a:ext uri="{FF2B5EF4-FFF2-40B4-BE49-F238E27FC236}">
-                <a16:creationId xmlns:a16="http://schemas.microsoft.com/office/drawing/2014/main" xmlns="" id="{CEFA5E0B-0718-4C33-83E9-398CBD71772D}"/>
+                <a16:creationId xmlns:a16="http://schemas.microsoft.com/office/drawing/2014/main" id="{CEFA5E0B-0718-4C33-83E9-398CBD71772D}"/>
               </a:ext>
             </a:extLst>
           </p:cNvPr>
@@ -3782,7 +3782,7 @@
           <p:cNvPr id="46" name="Diamond 45">
             <a:extLst>
               <a:ext uri="{FF2B5EF4-FFF2-40B4-BE49-F238E27FC236}">
-                <a16:creationId xmlns:a16="http://schemas.microsoft.com/office/drawing/2014/main" xmlns="" id="{FDB4A38F-F816-4320-82EB-071E9BA2EFAB}"/>
+                <a16:creationId xmlns:a16="http://schemas.microsoft.com/office/drawing/2014/main" id="{FDB4A38F-F816-4320-82EB-071E9BA2EFAB}"/>
               </a:ext>
             </a:extLst>
           </p:cNvPr>
@@ -3831,7 +3831,7 @@
           <p:cNvPr id="47" name="TextBox 46">
             <a:extLst>
               <a:ext uri="{FF2B5EF4-FFF2-40B4-BE49-F238E27FC236}">
-                <a16:creationId xmlns:a16="http://schemas.microsoft.com/office/drawing/2014/main" xmlns="" id="{791A7435-1CBD-4D64-B373-CDF617409EFD}"/>
+                <a16:creationId xmlns:a16="http://schemas.microsoft.com/office/drawing/2014/main" id="{791A7435-1CBD-4D64-B373-CDF617409EFD}"/>
               </a:ext>
             </a:extLst>
           </p:cNvPr>
@@ -3866,7 +3866,7 @@
           <p:cNvPr id="48" name="TextBox 47">
             <a:extLst>
               <a:ext uri="{FF2B5EF4-FFF2-40B4-BE49-F238E27FC236}">
-                <a16:creationId xmlns:a16="http://schemas.microsoft.com/office/drawing/2014/main" xmlns="" id="{300470AD-DA4C-4F16-91F5-E3E560CDBEFC}"/>
+                <a16:creationId xmlns:a16="http://schemas.microsoft.com/office/drawing/2014/main" id="{300470AD-DA4C-4F16-91F5-E3E560CDBEFC}"/>
               </a:ext>
             </a:extLst>
           </p:cNvPr>
@@ -3901,7 +3901,7 @@
           <p:cNvPr id="51" name="Rectangle: Rounded Corners 50">
             <a:extLst>
               <a:ext uri="{FF2B5EF4-FFF2-40B4-BE49-F238E27FC236}">
-                <a16:creationId xmlns:a16="http://schemas.microsoft.com/office/drawing/2014/main" xmlns="" id="{D62D81FC-C644-4602-90C8-B7974D14CA54}"/>
+                <a16:creationId xmlns:a16="http://schemas.microsoft.com/office/drawing/2014/main" id="{D62D81FC-C644-4602-90C8-B7974D14CA54}"/>
               </a:ext>
             </a:extLst>
           </p:cNvPr>
@@ -3911,7 +3911,7 @@
         <p:spPr>
           <a:xfrm>
             <a:off x="7188198" y="2606729"/>
-            <a:ext cx="1634410" cy="646330"/>
+            <a:ext cx="1870298" cy="646330"/>
           </a:xfrm>
           <a:prstGeom prst="roundRect">
             <a:avLst/>
@@ -3942,8 +3942,20 @@
           <a:p>
             <a:pPr algn="ctr"/>
             <a:r>
+              <a:rPr lang="en-SG" sz="1801" dirty="0" smtClean="0"/>
+              <a:t>Add </a:t>
+            </a:r>
+            <a:r>
+              <a:rPr lang="en-SG" sz="1801" dirty="0" err="1" smtClean="0"/>
+              <a:t>addressbook</a:t>
+            </a:r>
+            <a:r>
+              <a:rPr lang="en-SG" sz="1801" dirty="0" smtClean="0"/>
+              <a:t> to </a:t>
+            </a:r>
+            <a:r>
               <a:rPr lang="en-SG" sz="1801" dirty="0"/>
-              <a:t>Add command to undo stack</a:t>
+              <a:t>undo stack</a:t>
             </a:r>
           </a:p>
         </p:txBody>
@@ -3953,7 +3965,7 @@
           <p:cNvPr id="56" name="Diamond 55">
             <a:extLst>
               <a:ext uri="{FF2B5EF4-FFF2-40B4-BE49-F238E27FC236}">
-                <a16:creationId xmlns:a16="http://schemas.microsoft.com/office/drawing/2014/main" xmlns="" id="{0ACD7DC4-F31E-42B2-9D34-41B1AE997EB1}"/>
+                <a16:creationId xmlns:a16="http://schemas.microsoft.com/office/drawing/2014/main" id="{0ACD7DC4-F31E-42B2-9D34-41B1AE997EB1}"/>
               </a:ext>
             </a:extLst>
           </p:cNvPr>
@@ -4002,7 +4014,7 @@
           <p:cNvPr id="69" name="Straight Arrow Connector 68">
             <a:extLst>
               <a:ext uri="{FF2B5EF4-FFF2-40B4-BE49-F238E27FC236}">
-                <a16:creationId xmlns:a16="http://schemas.microsoft.com/office/drawing/2014/main" xmlns="" id="{7BE2639B-14BA-4C9C-9964-899CEF3278C9}"/>
+                <a16:creationId xmlns:a16="http://schemas.microsoft.com/office/drawing/2014/main" id="{7BE2639B-14BA-4C9C-9964-899CEF3278C9}"/>
               </a:ext>
             </a:extLst>
           </p:cNvPr>
@@ -4045,7 +4057,7 @@
           <p:cNvPr id="75" name="Group 74">
             <a:extLst>
               <a:ext uri="{FF2B5EF4-FFF2-40B4-BE49-F238E27FC236}">
-                <a16:creationId xmlns:a16="http://schemas.microsoft.com/office/drawing/2014/main" xmlns="" id="{A48F4168-7D41-4ED6-97F1-58289DDE3C4D}"/>
+                <a16:creationId xmlns:a16="http://schemas.microsoft.com/office/drawing/2014/main" id="{A48F4168-7D41-4ED6-97F1-58289DDE3C4D}"/>
               </a:ext>
             </a:extLst>
           </p:cNvPr>
@@ -4065,7 +4077,7 @@
             <p:cNvPr id="68" name="Oval 67">
               <a:extLst>
                 <a:ext uri="{FF2B5EF4-FFF2-40B4-BE49-F238E27FC236}">
-                  <a16:creationId xmlns:a16="http://schemas.microsoft.com/office/drawing/2014/main" xmlns="" id="{E423C8D7-553D-4A16-BA68-78DB113CAEC3}"/>
+                  <a16:creationId xmlns:a16="http://schemas.microsoft.com/office/drawing/2014/main" id="{E423C8D7-553D-4A16-BA68-78DB113CAEC3}"/>
                 </a:ext>
               </a:extLst>
             </p:cNvPr>
@@ -4117,7 +4129,7 @@
             <p:cNvPr id="71" name="Oval 70">
               <a:extLst>
                 <a:ext uri="{FF2B5EF4-FFF2-40B4-BE49-F238E27FC236}">
-                  <a16:creationId xmlns:a16="http://schemas.microsoft.com/office/drawing/2014/main" xmlns="" id="{1F41AA13-1BFC-498E-BBC4-DC32053E38E1}"/>
+                  <a16:creationId xmlns:a16="http://schemas.microsoft.com/office/drawing/2014/main" id="{1F41AA13-1BFC-498E-BBC4-DC32053E38E1}"/>
                 </a:ext>
               </a:extLst>
             </p:cNvPr>
@@ -4395,8 +4407,8 @@
         </p:nvCxnSpPr>
         <p:spPr>
           <a:xfrm>
-            <a:off x="8822608" y="2929894"/>
-            <a:ext cx="476270" cy="137974"/>
+            <a:off x="9058496" y="2929894"/>
+            <a:ext cx="240382" cy="137974"/>
           </a:xfrm>
           <a:prstGeom prst="bentConnector2">
             <a:avLst/>

</xml_diff>

<commit_message>
Interdiff between v15 and v16
</commit_message>
<xml_diff>
--- a/docs/diagrams/UndoRedoActivityDiagram.pptx
+++ b/docs/diagrams/UndoRedoActivityDiagram.pptx
@@ -265,7 +265,7 @@
           <a:p>
             <a:fld id="{542F47FF-5056-41FF-A1F8-23A414798AA4}" type="datetimeFigureOut">
               <a:rPr lang="en-SG" smtClean="0"/>
-              <a:t>27/6/2018</a:t>
+              <a:t>6/7/2018</a:t>
             </a:fld>
             <a:endParaRPr lang="en-SG"/>
           </a:p>
@@ -465,7 +465,7 @@
           <a:p>
             <a:fld id="{542F47FF-5056-41FF-A1F8-23A414798AA4}" type="datetimeFigureOut">
               <a:rPr lang="en-SG" smtClean="0"/>
-              <a:t>27/6/2018</a:t>
+              <a:t>6/7/2018</a:t>
             </a:fld>
             <a:endParaRPr lang="en-SG"/>
           </a:p>
@@ -675,7 +675,7 @@
           <a:p>
             <a:fld id="{542F47FF-5056-41FF-A1F8-23A414798AA4}" type="datetimeFigureOut">
               <a:rPr lang="en-SG" smtClean="0"/>
-              <a:t>27/6/2018</a:t>
+              <a:t>6/7/2018</a:t>
             </a:fld>
             <a:endParaRPr lang="en-SG"/>
           </a:p>
@@ -875,7 +875,7 @@
           <a:p>
             <a:fld id="{542F47FF-5056-41FF-A1F8-23A414798AA4}" type="datetimeFigureOut">
               <a:rPr lang="en-SG" smtClean="0"/>
-              <a:t>27/6/2018</a:t>
+              <a:t>6/7/2018</a:t>
             </a:fld>
             <a:endParaRPr lang="en-SG"/>
           </a:p>
@@ -1151,7 +1151,7 @@
           <a:p>
             <a:fld id="{542F47FF-5056-41FF-A1F8-23A414798AA4}" type="datetimeFigureOut">
               <a:rPr lang="en-SG" smtClean="0"/>
-              <a:t>27/6/2018</a:t>
+              <a:t>6/7/2018</a:t>
             </a:fld>
             <a:endParaRPr lang="en-SG"/>
           </a:p>
@@ -1419,7 +1419,7 @@
           <a:p>
             <a:fld id="{542F47FF-5056-41FF-A1F8-23A414798AA4}" type="datetimeFigureOut">
               <a:rPr lang="en-SG" smtClean="0"/>
-              <a:t>27/6/2018</a:t>
+              <a:t>6/7/2018</a:t>
             </a:fld>
             <a:endParaRPr lang="en-SG"/>
           </a:p>
@@ -1834,7 +1834,7 @@
           <a:p>
             <a:fld id="{542F47FF-5056-41FF-A1F8-23A414798AA4}" type="datetimeFigureOut">
               <a:rPr lang="en-SG" smtClean="0"/>
-              <a:t>27/6/2018</a:t>
+              <a:t>6/7/2018</a:t>
             </a:fld>
             <a:endParaRPr lang="en-SG"/>
           </a:p>
@@ -1976,7 +1976,7 @@
           <a:p>
             <a:fld id="{542F47FF-5056-41FF-A1F8-23A414798AA4}" type="datetimeFigureOut">
               <a:rPr lang="en-SG" smtClean="0"/>
-              <a:t>27/6/2018</a:t>
+              <a:t>6/7/2018</a:t>
             </a:fld>
             <a:endParaRPr lang="en-SG"/>
           </a:p>
@@ -2089,7 +2089,7 @@
           <a:p>
             <a:fld id="{542F47FF-5056-41FF-A1F8-23A414798AA4}" type="datetimeFigureOut">
               <a:rPr lang="en-SG" smtClean="0"/>
-              <a:t>27/6/2018</a:t>
+              <a:t>6/7/2018</a:t>
             </a:fld>
             <a:endParaRPr lang="en-SG"/>
           </a:p>
@@ -2402,7 +2402,7 @@
           <a:p>
             <a:fld id="{542F47FF-5056-41FF-A1F8-23A414798AA4}" type="datetimeFigureOut">
               <a:rPr lang="en-SG" smtClean="0"/>
-              <a:t>27/6/2018</a:t>
+              <a:t>6/7/2018</a:t>
             </a:fld>
             <a:endParaRPr lang="en-SG"/>
           </a:p>
@@ -2691,7 +2691,7 @@
           <a:p>
             <a:fld id="{542F47FF-5056-41FF-A1F8-23A414798AA4}" type="datetimeFigureOut">
               <a:rPr lang="en-SG" smtClean="0"/>
-              <a:t>27/6/2018</a:t>
+              <a:t>6/7/2018</a:t>
             </a:fld>
             <a:endParaRPr lang="en-SG"/>
           </a:p>
@@ -2934,7 +2934,7 @@
           <a:p>
             <a:fld id="{542F47FF-5056-41FF-A1F8-23A414798AA4}" type="datetimeFigureOut">
               <a:rPr lang="en-SG" smtClean="0"/>
-              <a:t>27/6/2018</a:t>
+              <a:t>6/7/2018</a:t>
             </a:fld>
             <a:endParaRPr lang="en-SG"/>
           </a:p>
@@ -3641,8 +3641,8 @@
         </p:nvSpPr>
         <p:spPr>
           <a:xfrm>
-            <a:off x="4828265" y="1865986"/>
-            <a:ext cx="1472017" cy="923714"/>
+            <a:off x="4412106" y="2102568"/>
+            <a:ext cx="2066045" cy="646587"/>
           </a:xfrm>
           <a:prstGeom prst="rect">
             <a:avLst/>
@@ -3657,15 +3657,15 @@
           <a:p>
             <a:r>
               <a:rPr lang="en-SG" sz="1801" dirty="0" smtClean="0"/>
-              <a:t>[command modifies </a:t>
-            </a:r>
-            <a:r>
-              <a:rPr lang="en-SG" sz="1801" dirty="0" err="1" smtClean="0"/>
-              <a:t>addressbook</a:t>
-            </a:r>
-            <a:r>
-              <a:rPr lang="en-SG" sz="1801" dirty="0" smtClean="0"/>
-              <a:t>]</a:t>
+              <a:t>[</a:t>
+            </a:r>
+            <a:r>
+              <a:rPr lang="en-US" dirty="0"/>
+              <a:t>command commits address </a:t>
+            </a:r>
+            <a:r>
+              <a:rPr lang="en-US" dirty="0" smtClean="0"/>
+              <a:t>book]</a:t>
             </a:r>
             <a:endParaRPr lang="en-SG" sz="1801" dirty="0"/>
           </a:p>
@@ -3718,7 +3718,15 @@
             <a:pPr algn="ctr"/>
             <a:r>
               <a:rPr lang="en-SG" sz="1801" dirty="0" smtClean="0"/>
-              <a:t>Save </a:t>
+              <a:t>Purge redundant states </a:t>
+            </a:r>
+            <a:r>
+              <a:rPr lang="en-SG" sz="1801" dirty="0"/>
+              <a:t>and then </a:t>
+            </a:r>
+            <a:r>
+              <a:rPr lang="en-SG" sz="1801" dirty="0" smtClean="0"/>
+              <a:t>save </a:t>
             </a:r>
             <a:r>
               <a:rPr lang="en-SG" sz="1801" dirty="0" err="1" smtClean="0"/>
@@ -3726,19 +3734,19 @@
             </a:r>
             <a:r>
               <a:rPr lang="en-SG" sz="1801" dirty="0" smtClean="0"/>
-              <a:t> to </a:t>
-            </a:r>
-            <a:r>
-              <a:rPr lang="en-SG" sz="1801" dirty="0" err="1" smtClean="0"/>
+              <a:t> </a:t>
+            </a:r>
+            <a:r>
+              <a:rPr lang="en-SG" sz="1801" dirty="0"/>
+              <a:t>to </a:t>
+            </a:r>
+            <a:r>
+              <a:rPr lang="en-SG" sz="1801" dirty="0" err="1"/>
               <a:t>addressBookStateList</a:t>
             </a:r>
             <a:r>
-              <a:rPr lang="en-SG" sz="1801" dirty="0" smtClean="0"/>
+              <a:rPr lang="en-SG" sz="1801" dirty="0"/>
               <a:t> </a:t>
-            </a:r>
-            <a:r>
-              <a:rPr lang="en-SG" sz="1801" dirty="0" smtClean="0"/>
-              <a:t>and clear redundant states</a:t>
             </a:r>
             <a:endParaRPr lang="en-SG" sz="1801" dirty="0"/>
           </a:p>

</xml_diff>

<commit_message>
modified diagrams related to undo redo functions
</commit_message>
<xml_diff>
--- a/docs/diagrams/UndoRedoActivityDiagram.pptx
+++ b/docs/diagrams/UndoRedoActivityDiagram.pptx
@@ -112,10 +112,6 @@
 </p:presentation>
 </file>
 
-<file path=ppt/revisionInfo.xml><?xml version="1.0" encoding="utf-8"?>
-<p1510:revInfo xmlns:a="http://schemas.openxmlformats.org/drawingml/2006/main" xmlns:r="http://schemas.openxmlformats.org/officeDocument/2006/relationships" xmlns:p1510="http://schemas.microsoft.com/office/powerpoint/2015/10/main"/>
-</file>
-
 <file path=ppt/slideLayouts/slideLayout1.xml><?xml version="1.0" encoding="utf-8"?>
 <p:sldLayout xmlns:a="http://schemas.openxmlformats.org/drawingml/2006/main" xmlns:r="http://schemas.openxmlformats.org/officeDocument/2006/relationships" xmlns:p="http://schemas.openxmlformats.org/presentationml/2006/main" type="title" preserve="1">
   <p:cSld name="Title Slide">
@@ -265,7 +261,7 @@
           <a:p>
             <a:fld id="{542F47FF-5056-41FF-A1F8-23A414798AA4}" type="datetimeFigureOut">
               <a:rPr lang="en-SG" smtClean="0"/>
-              <a:t>6/7/2018</a:t>
+              <a:t>11/4/2019</a:t>
             </a:fld>
             <a:endParaRPr lang="en-SG"/>
           </a:p>
@@ -465,7 +461,7 @@
           <a:p>
             <a:fld id="{542F47FF-5056-41FF-A1F8-23A414798AA4}" type="datetimeFigureOut">
               <a:rPr lang="en-SG" smtClean="0"/>
-              <a:t>6/7/2018</a:t>
+              <a:t>11/4/2019</a:t>
             </a:fld>
             <a:endParaRPr lang="en-SG"/>
           </a:p>
@@ -675,7 +671,7 @@
           <a:p>
             <a:fld id="{542F47FF-5056-41FF-A1F8-23A414798AA4}" type="datetimeFigureOut">
               <a:rPr lang="en-SG" smtClean="0"/>
-              <a:t>6/7/2018</a:t>
+              <a:t>11/4/2019</a:t>
             </a:fld>
             <a:endParaRPr lang="en-SG"/>
           </a:p>
@@ -875,7 +871,7 @@
           <a:p>
             <a:fld id="{542F47FF-5056-41FF-A1F8-23A414798AA4}" type="datetimeFigureOut">
               <a:rPr lang="en-SG" smtClean="0"/>
-              <a:t>6/7/2018</a:t>
+              <a:t>11/4/2019</a:t>
             </a:fld>
             <a:endParaRPr lang="en-SG"/>
           </a:p>
@@ -1151,7 +1147,7 @@
           <a:p>
             <a:fld id="{542F47FF-5056-41FF-A1F8-23A414798AA4}" type="datetimeFigureOut">
               <a:rPr lang="en-SG" smtClean="0"/>
-              <a:t>6/7/2018</a:t>
+              <a:t>11/4/2019</a:t>
             </a:fld>
             <a:endParaRPr lang="en-SG"/>
           </a:p>
@@ -1419,7 +1415,7 @@
           <a:p>
             <a:fld id="{542F47FF-5056-41FF-A1F8-23A414798AA4}" type="datetimeFigureOut">
               <a:rPr lang="en-SG" smtClean="0"/>
-              <a:t>6/7/2018</a:t>
+              <a:t>11/4/2019</a:t>
             </a:fld>
             <a:endParaRPr lang="en-SG"/>
           </a:p>
@@ -1834,7 +1830,7 @@
           <a:p>
             <a:fld id="{542F47FF-5056-41FF-A1F8-23A414798AA4}" type="datetimeFigureOut">
               <a:rPr lang="en-SG" smtClean="0"/>
-              <a:t>6/7/2018</a:t>
+              <a:t>11/4/2019</a:t>
             </a:fld>
             <a:endParaRPr lang="en-SG"/>
           </a:p>
@@ -1976,7 +1972,7 @@
           <a:p>
             <a:fld id="{542F47FF-5056-41FF-A1F8-23A414798AA4}" type="datetimeFigureOut">
               <a:rPr lang="en-SG" smtClean="0"/>
-              <a:t>6/7/2018</a:t>
+              <a:t>11/4/2019</a:t>
             </a:fld>
             <a:endParaRPr lang="en-SG"/>
           </a:p>
@@ -2089,7 +2085,7 @@
           <a:p>
             <a:fld id="{542F47FF-5056-41FF-A1F8-23A414798AA4}" type="datetimeFigureOut">
               <a:rPr lang="en-SG" smtClean="0"/>
-              <a:t>6/7/2018</a:t>
+              <a:t>11/4/2019</a:t>
             </a:fld>
             <a:endParaRPr lang="en-SG"/>
           </a:p>
@@ -2402,7 +2398,7 @@
           <a:p>
             <a:fld id="{542F47FF-5056-41FF-A1F8-23A414798AA4}" type="datetimeFigureOut">
               <a:rPr lang="en-SG" smtClean="0"/>
-              <a:t>6/7/2018</a:t>
+              <a:t>11/4/2019</a:t>
             </a:fld>
             <a:endParaRPr lang="en-SG"/>
           </a:p>
@@ -2691,7 +2687,7 @@
           <a:p>
             <a:fld id="{542F47FF-5056-41FF-A1F8-23A414798AA4}" type="datetimeFigureOut">
               <a:rPr lang="en-SG" smtClean="0"/>
-              <a:t>6/7/2018</a:t>
+              <a:t>11/4/2019</a:t>
             </a:fld>
             <a:endParaRPr lang="en-SG"/>
           </a:p>
@@ -2934,7 +2930,7 @@
           <a:p>
             <a:fld id="{542F47FF-5056-41FF-A1F8-23A414798AA4}" type="datetimeFigureOut">
               <a:rPr lang="en-SG" smtClean="0"/>
-              <a:t>6/7/2018</a:t>
+              <a:t>11/4/2019</a:t>
             </a:fld>
             <a:endParaRPr lang="en-SG"/>
           </a:p>
@@ -3656,7 +3652,7 @@
             </a:r>
             <a:r>
               <a:rPr lang="en-US" dirty="0"/>
-              <a:t>command commits address book]</a:t>
+              <a:t>command commits contact list]</a:t>
             </a:r>
             <a:endParaRPr lang="en-SG" sz="1801" dirty="0"/>
           </a:p>
@@ -3709,11 +3705,11 @@
             <a:pPr algn="ctr"/>
             <a:r>
               <a:rPr lang="en-SG" sz="1801" dirty="0"/>
-              <a:t>Purge redundant states and then save address book to </a:t>
+              <a:t>Purge redundant states and then save contact list to </a:t>
             </a:r>
             <a:r>
               <a:rPr lang="en-SG" sz="1801" dirty="0" err="1"/>
-              <a:t>addressBookStateList</a:t>
+              <a:t>contactListStateList</a:t>
             </a:r>
             <a:r>
               <a:rPr lang="en-SG" sz="1801" dirty="0"/>

</xml_diff>